<commit_message>
Added pdf ver of presentation
</commit_message>
<xml_diff>
--- a/DG_Cab_Investment_firm_presentation.pptx
+++ b/DG_Cab_Investment_firm_presentation.pptx
@@ -24,7 +24,12 @@
     <p:sldId id="285" r:id="rId18"/>
     <p:sldId id="286" r:id="rId19"/>
     <p:sldId id="287" r:id="rId20"/>
-    <p:sldId id="268" r:id="rId21"/>
+    <p:sldId id="290" r:id="rId21"/>
+    <p:sldId id="291" r:id="rId22"/>
+    <p:sldId id="288" r:id="rId23"/>
+    <p:sldId id="289" r:id="rId24"/>
+    <p:sldId id="292" r:id="rId25"/>
+    <p:sldId id="268" r:id="rId26"/>
   </p:sldIdLst>
   <p:sldSz cx="12192000" cy="6858000"/>
   <p:notesSz cx="6858000" cy="9144000"/>
@@ -139,6 +144,58 @@
 </p1510:revInfo>
 </file>
 
+<file path=ppt/ink/ink1.xml><?xml version="1.0" encoding="utf-8"?>
+<inkml:ink xmlns:inkml="http://www.w3.org/2003/InkML">
+  <inkml:definitions>
+    <inkml:context xml:id="ctx0">
+      <inkml:inkSource xml:id="inkSrc0">
+        <inkml:traceFormat>
+          <inkml:channel name="X" type="integer" min="-2.14748E9" max="2.14748E9" units="cm"/>
+          <inkml:channel name="Y" type="integer" min="-2.14748E9" max="2.14748E9" units="cm"/>
+        </inkml:traceFormat>
+        <inkml:channelProperties>
+          <inkml:channelProperty channel="X" name="resolution" value="1000" units="1/cm"/>
+          <inkml:channelProperty channel="Y" name="resolution" value="1000" units="1/cm"/>
+        </inkml:channelProperties>
+      </inkml:inkSource>
+      <inkml:timestamp xml:id="ts0" timeString="2022-07-21T22:18:12.414"/>
+    </inkml:context>
+    <inkml:brush xml:id="br0">
+      <inkml:brushProperty name="width" value="0.05" units="cm"/>
+      <inkml:brushProperty name="height" value="0.05" units="cm"/>
+      <inkml:brushProperty name="ignorePressure" value="1"/>
+    </inkml:brush>
+  </inkml:definitions>
+  <inkml:trace contextRef="#ctx0" brushRef="#br0">0 0,'0'12304,"0"-12893,0 568</inkml:trace>
+</inkml:ink>
+</file>
+
+<file path=ppt/ink/ink2.xml><?xml version="1.0" encoding="utf-8"?>
+<inkml:ink xmlns:inkml="http://www.w3.org/2003/InkML">
+  <inkml:definitions>
+    <inkml:context xml:id="ctx0">
+      <inkml:inkSource xml:id="inkSrc0">
+        <inkml:traceFormat>
+          <inkml:channel name="X" type="integer" min="-2.14748E9" max="2.14748E9" units="cm"/>
+          <inkml:channel name="Y" type="integer" min="-2.14748E9" max="2.14748E9" units="cm"/>
+        </inkml:traceFormat>
+        <inkml:channelProperties>
+          <inkml:channelProperty channel="X" name="resolution" value="1000" units="1/cm"/>
+          <inkml:channelProperty channel="Y" name="resolution" value="1000" units="1/cm"/>
+        </inkml:channelProperties>
+      </inkml:inkSource>
+      <inkml:timestamp xml:id="ts0" timeString="2022-07-21T22:18:12.414"/>
+    </inkml:context>
+    <inkml:brush xml:id="br0">
+      <inkml:brushProperty name="width" value="0.05" units="cm"/>
+      <inkml:brushProperty name="height" value="0.05" units="cm"/>
+      <inkml:brushProperty name="ignorePressure" value="1"/>
+    </inkml:brush>
+  </inkml:definitions>
+  <inkml:trace contextRef="#ctx0" brushRef="#br0">0 0,'0'12304,"0"-12893,0 568</inkml:trace>
+</inkml:ink>
+</file>
+
 <file path=ppt/slideLayouts/slideLayout1.xml><?xml version="1.0" encoding="utf-8"?>
 <p:sldLayout xmlns:a="http://schemas.openxmlformats.org/drawingml/2006/main" xmlns:r="http://schemas.openxmlformats.org/officeDocument/2006/relationships" xmlns:p="http://schemas.openxmlformats.org/presentationml/2006/main" type="title" preserve="1">
   <p:cSld name="Title Slide">
@@ -268,7 +325,7 @@
           <a:p>
             <a:fld id="{C764DE79-268F-4C1A-8933-263129D2AF90}" type="datetimeFigureOut">
               <a:rPr lang="en-US" dirty="0"/>
-              <a:t>7/20/2022</a:t>
+              <a:t>7/21/2022</a:t>
             </a:fld>
             <a:endParaRPr lang="en-US"/>
           </a:p>
@@ -436,7 +493,7 @@
           <a:p>
             <a:fld id="{C764DE79-268F-4C1A-8933-263129D2AF90}" type="datetimeFigureOut">
               <a:rPr lang="en-US" dirty="0"/>
-              <a:t>7/20/2022</a:t>
+              <a:t>7/21/2022</a:t>
             </a:fld>
             <a:endParaRPr lang="en-US"/>
           </a:p>
@@ -614,7 +671,7 @@
           <a:p>
             <a:fld id="{C764DE79-268F-4C1A-8933-263129D2AF90}" type="datetimeFigureOut">
               <a:rPr lang="en-US" dirty="0"/>
-              <a:t>7/20/2022</a:t>
+              <a:t>7/21/2022</a:t>
             </a:fld>
             <a:endParaRPr lang="en-US"/>
           </a:p>
@@ -782,7 +839,7 @@
           <a:p>
             <a:fld id="{C764DE79-268F-4C1A-8933-263129D2AF90}" type="datetimeFigureOut">
               <a:rPr lang="en-US" dirty="0"/>
-              <a:t>7/20/2022</a:t>
+              <a:t>7/21/2022</a:t>
             </a:fld>
             <a:endParaRPr lang="en-US"/>
           </a:p>
@@ -1027,7 +1084,7 @@
           <a:p>
             <a:fld id="{C764DE79-268F-4C1A-8933-263129D2AF90}" type="datetimeFigureOut">
               <a:rPr lang="en-US" dirty="0"/>
-              <a:t>7/20/2022</a:t>
+              <a:t>7/21/2022</a:t>
             </a:fld>
             <a:endParaRPr lang="en-US"/>
           </a:p>
@@ -1256,7 +1313,7 @@
           <a:p>
             <a:fld id="{C764DE79-268F-4C1A-8933-263129D2AF90}" type="datetimeFigureOut">
               <a:rPr lang="en-US" dirty="0"/>
-              <a:t>7/20/2022</a:t>
+              <a:t>7/21/2022</a:t>
             </a:fld>
             <a:endParaRPr lang="en-US"/>
           </a:p>
@@ -1620,7 +1677,7 @@
           <a:p>
             <a:fld id="{C764DE79-268F-4C1A-8933-263129D2AF90}" type="datetimeFigureOut">
               <a:rPr lang="en-US" dirty="0"/>
-              <a:t>7/20/2022</a:t>
+              <a:t>7/21/2022</a:t>
             </a:fld>
             <a:endParaRPr lang="en-US"/>
           </a:p>
@@ -1737,7 +1794,7 @@
           <a:p>
             <a:fld id="{C764DE79-268F-4C1A-8933-263129D2AF90}" type="datetimeFigureOut">
               <a:rPr lang="en-US" dirty="0"/>
-              <a:t>7/20/2022</a:t>
+              <a:t>7/21/2022</a:t>
             </a:fld>
             <a:endParaRPr lang="en-US"/>
           </a:p>
@@ -1832,7 +1889,7 @@
           <a:p>
             <a:fld id="{C764DE79-268F-4C1A-8933-263129D2AF90}" type="datetimeFigureOut">
               <a:rPr lang="en-US" dirty="0"/>
-              <a:t>7/20/2022</a:t>
+              <a:t>7/21/2022</a:t>
             </a:fld>
             <a:endParaRPr lang="en-US"/>
           </a:p>
@@ -2107,7 +2164,7 @@
           <a:p>
             <a:fld id="{C764DE79-268F-4C1A-8933-263129D2AF90}" type="datetimeFigureOut">
               <a:rPr lang="en-US" dirty="0"/>
-              <a:t>7/20/2022</a:t>
+              <a:t>7/21/2022</a:t>
             </a:fld>
             <a:endParaRPr lang="en-US"/>
           </a:p>
@@ -2359,7 +2416,7 @@
           <a:p>
             <a:fld id="{C764DE79-268F-4C1A-8933-263129D2AF90}" type="datetimeFigureOut">
               <a:rPr lang="en-US" dirty="0"/>
-              <a:t>7/20/2022</a:t>
+              <a:t>7/21/2022</a:t>
             </a:fld>
             <a:endParaRPr lang="en-US"/>
           </a:p>
@@ -2570,7 +2627,7 @@
           <a:p>
             <a:fld id="{C764DE79-268F-4C1A-8933-263129D2AF90}" type="datetimeFigureOut">
               <a:rPr lang="en-US" dirty="0"/>
-              <a:t>7/20/2022</a:t>
+              <a:t>7/21/2022</a:t>
             </a:fld>
             <a:endParaRPr lang="en-US"/>
           </a:p>
@@ -3034,7 +3091,7 @@
         <p:spPr>
           <a:xfrm>
             <a:off x="870857" y="2380343"/>
-            <a:ext cx="8873711" cy="2769989"/>
+            <a:ext cx="8873711" cy="3200876"/>
           </a:xfrm>
           <a:prstGeom prst="rect">
             <a:avLst/>
@@ -3072,6 +3129,17 @@
               <a:rPr lang="en-US" sz="2800" b="1" dirty="0"/>
               <a:t>July 20, 2022</a:t>
             </a:r>
+          </a:p>
+          <a:p>
+            <a:r>
+              <a:rPr lang="en-US" sz="2800" b="1" dirty="0"/>
+              <a:t>By Jeffery </a:t>
+            </a:r>
+            <a:r>
+              <a:rPr lang="en-US" sz="2800" b="1"/>
+              <a:t>Su</a:t>
+            </a:r>
+            <a:endParaRPr lang="en-US" sz="2800" b="1" dirty="0"/>
           </a:p>
         </p:txBody>
       </p:sp>
@@ -6006,6 +6074,2224 @@
 </file>
 
 <file path=ppt/slides/slide20.xml><?xml version="1.0" encoding="utf-8"?>
+<p:sld xmlns:a="http://schemas.openxmlformats.org/drawingml/2006/main" xmlns:r="http://schemas.openxmlformats.org/officeDocument/2006/relationships" xmlns:p="http://schemas.openxmlformats.org/presentationml/2006/main">
+  <p:cSld>
+    <p:spTree>
+      <p:nvGrpSpPr>
+        <p:cNvPr id="1" name=""/>
+        <p:cNvGrpSpPr/>
+        <p:nvPr/>
+      </p:nvGrpSpPr>
+      <p:grpSpPr>
+        <a:xfrm>
+          <a:off x="0" y="0"/>
+          <a:ext cx="0" cy="0"/>
+          <a:chOff x="0" y="0"/>
+          <a:chExt cx="0" cy="0"/>
+        </a:xfrm>
+      </p:grpSpPr>
+      <p:sp>
+        <p:nvSpPr>
+          <p:cNvPr id="2" name="Title 1">
+            <a:extLst>
+              <a:ext uri="{FF2B5EF4-FFF2-40B4-BE49-F238E27FC236}">
+                <a16:creationId xmlns:a16="http://schemas.microsoft.com/office/drawing/2014/main" id="{E8B8F26E-9345-4747-9094-972E38700A17}"/>
+              </a:ext>
+            </a:extLst>
+          </p:cNvPr>
+          <p:cNvSpPr>
+            <a:spLocks noGrp="1"/>
+          </p:cNvSpPr>
+          <p:nvPr>
+            <p:ph type="ctrTitle"/>
+          </p:nvPr>
+        </p:nvSpPr>
+        <p:spPr>
+          <a:xfrm rot="5400000">
+            <a:off x="-2601688" y="2601687"/>
+            <a:ext cx="6858002" cy="1654627"/>
+          </a:xfrm>
+          <a:solidFill>
+            <a:srgbClr val="3B3B3B"/>
+          </a:solidFill>
+        </p:spPr>
+        <p:txBody>
+          <a:bodyPr vert="vert270" anchor="t" anchorCtr="0"/>
+          <a:lstStyle/>
+          <a:p>
+            <a:endParaRPr lang="en-US" b="1" dirty="0">
+              <a:solidFill>
+                <a:srgbClr val="FF6600"/>
+              </a:solidFill>
+            </a:endParaRPr>
+          </a:p>
+        </p:txBody>
+      </p:sp>
+      <p:pic>
+        <p:nvPicPr>
+          <p:cNvPr id="4" name="Picture 3">
+            <a:extLst>
+              <a:ext uri="{FF2B5EF4-FFF2-40B4-BE49-F238E27FC236}">
+                <a16:creationId xmlns:a16="http://schemas.microsoft.com/office/drawing/2014/main" id="{7A465064-0714-5743-882B-8875105A7023}"/>
+              </a:ext>
+            </a:extLst>
+          </p:cNvPr>
+          <p:cNvPicPr>
+            <a:picLocks noChangeAspect="1"/>
+          </p:cNvPicPr>
+          <p:nvPr/>
+        </p:nvPicPr>
+        <p:blipFill>
+          <a:blip r:embed="rId2" cstate="print">
+            <a:extLst>
+              <a:ext uri="{28A0092B-C50C-407E-A947-70E740481C1C}">
+                <a14:useLocalDpi xmlns:a14="http://schemas.microsoft.com/office/drawing/2010/main" val="0"/>
+              </a:ext>
+            </a:extLst>
+          </a:blip>
+          <a:stretch>
+            <a:fillRect/>
+          </a:stretch>
+        </p:blipFill>
+        <p:spPr>
+          <a:xfrm>
+            <a:off x="0" y="5863771"/>
+            <a:ext cx="1654627" cy="994232"/>
+          </a:xfrm>
+          <a:prstGeom prst="rect">
+            <a:avLst/>
+          </a:prstGeom>
+        </p:spPr>
+      </p:pic>
+      <p:sp>
+        <p:nvSpPr>
+          <p:cNvPr id="6" name="Subtitle 5">
+            <a:extLst>
+              <a:ext uri="{FF2B5EF4-FFF2-40B4-BE49-F238E27FC236}">
+                <a16:creationId xmlns:a16="http://schemas.microsoft.com/office/drawing/2014/main" id="{2D4BA697-580E-5544-8F2F-194AD99B859F}"/>
+              </a:ext>
+            </a:extLst>
+          </p:cNvPr>
+          <p:cNvSpPr>
+            <a:spLocks noGrp="1"/>
+          </p:cNvSpPr>
+          <p:nvPr>
+            <p:ph type="subTitle" idx="1"/>
+          </p:nvPr>
+        </p:nvSpPr>
+        <p:spPr>
+          <a:xfrm>
+            <a:off x="1654627" y="0"/>
+            <a:ext cx="9170391" cy="1655762"/>
+          </a:xfrm>
+        </p:spPr>
+        <p:txBody>
+          <a:bodyPr>
+            <a:normAutofit/>
+          </a:bodyPr>
+          <a:lstStyle/>
+          <a:p>
+            <a:pPr algn="l"/>
+            <a:r>
+              <a:rPr lang="en-US" sz="5500" dirty="0">
+                <a:solidFill>
+                  <a:srgbClr val="FF6600"/>
+                </a:solidFill>
+              </a:rPr>
+              <a:t>Hypothesis Testing</a:t>
+            </a:r>
+          </a:p>
+          <a:p>
+            <a:pPr algn="l"/>
+            <a:endParaRPr lang="en-US" sz="6600" dirty="0">
+              <a:solidFill>
+                <a:srgbClr val="FF6600"/>
+              </a:solidFill>
+            </a:endParaRPr>
+          </a:p>
+        </p:txBody>
+      </p:sp>
+      <p:pic>
+        <p:nvPicPr>
+          <p:cNvPr id="7" name="Picture 6">
+            <a:extLst>
+              <a:ext uri="{FF2B5EF4-FFF2-40B4-BE49-F238E27FC236}">
+                <a16:creationId xmlns:a16="http://schemas.microsoft.com/office/drawing/2014/main" id="{9B35AC6A-5838-BC09-E0BD-3201DD5BCAA3}"/>
+              </a:ext>
+            </a:extLst>
+          </p:cNvPr>
+          <p:cNvPicPr>
+            <a:picLocks noChangeAspect="1"/>
+          </p:cNvPicPr>
+          <p:nvPr/>
+        </p:nvPicPr>
+        <p:blipFill rotWithShape="1">
+          <a:blip r:embed="rId3"/>
+          <a:srcRect b="76524"/>
+          <a:stretch/>
+        </p:blipFill>
+        <p:spPr>
+          <a:xfrm>
+            <a:off x="3733406" y="923131"/>
+            <a:ext cx="5639587" cy="943769"/>
+          </a:xfrm>
+          <a:prstGeom prst="rect">
+            <a:avLst/>
+          </a:prstGeom>
+        </p:spPr>
+      </p:pic>
+      <p:pic>
+        <p:nvPicPr>
+          <p:cNvPr id="10" name="Picture 9">
+            <a:extLst>
+              <a:ext uri="{FF2B5EF4-FFF2-40B4-BE49-F238E27FC236}">
+                <a16:creationId xmlns:a16="http://schemas.microsoft.com/office/drawing/2014/main" id="{59E023CB-29DC-5076-5419-93D8A2EB58E7}"/>
+              </a:ext>
+            </a:extLst>
+          </p:cNvPr>
+          <p:cNvPicPr>
+            <a:picLocks noChangeAspect="1"/>
+          </p:cNvPicPr>
+          <p:nvPr/>
+        </p:nvPicPr>
+        <p:blipFill rotWithShape="1">
+          <a:blip r:embed="rId3"/>
+          <a:srcRect t="76524" b="13999"/>
+          <a:stretch/>
+        </p:blipFill>
+        <p:spPr>
+          <a:xfrm>
+            <a:off x="4800206" y="1866901"/>
+            <a:ext cx="5639587" cy="381000"/>
+          </a:xfrm>
+          <a:prstGeom prst="rect">
+            <a:avLst/>
+          </a:prstGeom>
+        </p:spPr>
+      </p:pic>
+      <p:pic>
+        <p:nvPicPr>
+          <p:cNvPr id="12" name="Picture 11">
+            <a:extLst>
+              <a:ext uri="{FF2B5EF4-FFF2-40B4-BE49-F238E27FC236}">
+                <a16:creationId xmlns:a16="http://schemas.microsoft.com/office/drawing/2014/main" id="{39013EA9-0A60-7241-1F49-7285DA129BC9}"/>
+              </a:ext>
+            </a:extLst>
+          </p:cNvPr>
+          <p:cNvPicPr>
+            <a:picLocks noChangeAspect="1"/>
+          </p:cNvPicPr>
+          <p:nvPr/>
+        </p:nvPicPr>
+        <p:blipFill rotWithShape="1">
+          <a:blip r:embed="rId4"/>
+          <a:srcRect b="84171"/>
+          <a:stretch/>
+        </p:blipFill>
+        <p:spPr>
+          <a:xfrm>
+            <a:off x="3733406" y="2284726"/>
+            <a:ext cx="6487430" cy="487049"/>
+          </a:xfrm>
+          <a:prstGeom prst="rect">
+            <a:avLst/>
+          </a:prstGeom>
+        </p:spPr>
+      </p:pic>
+      <p:pic>
+        <p:nvPicPr>
+          <p:cNvPr id="14" name="Picture 13">
+            <a:extLst>
+              <a:ext uri="{FF2B5EF4-FFF2-40B4-BE49-F238E27FC236}">
+                <a16:creationId xmlns:a16="http://schemas.microsoft.com/office/drawing/2014/main" id="{26B181B4-EC19-6C05-C3E0-994E92FA8AA0}"/>
+              </a:ext>
+            </a:extLst>
+          </p:cNvPr>
+          <p:cNvPicPr>
+            <a:picLocks noChangeAspect="1"/>
+          </p:cNvPicPr>
+          <p:nvPr/>
+        </p:nvPicPr>
+        <p:blipFill rotWithShape="1">
+          <a:blip r:embed="rId4"/>
+          <a:srcRect t="86665"/>
+          <a:stretch/>
+        </p:blipFill>
+        <p:spPr>
+          <a:xfrm>
+            <a:off x="4800206" y="2779279"/>
+            <a:ext cx="6487430" cy="410322"/>
+          </a:xfrm>
+          <a:prstGeom prst="rect">
+            <a:avLst/>
+          </a:prstGeom>
+        </p:spPr>
+      </p:pic>
+      <p:pic>
+        <p:nvPicPr>
+          <p:cNvPr id="16" name="Picture 15">
+            <a:extLst>
+              <a:ext uri="{FF2B5EF4-FFF2-40B4-BE49-F238E27FC236}">
+                <a16:creationId xmlns:a16="http://schemas.microsoft.com/office/drawing/2014/main" id="{C63D6423-7155-A3A9-A9DB-6A8AD715D6D7}"/>
+              </a:ext>
+            </a:extLst>
+          </p:cNvPr>
+          <p:cNvPicPr>
+            <a:picLocks noChangeAspect="1"/>
+          </p:cNvPicPr>
+          <p:nvPr/>
+        </p:nvPicPr>
+        <p:blipFill rotWithShape="1">
+          <a:blip r:embed="rId5"/>
+          <a:srcRect b="84171"/>
+          <a:stretch/>
+        </p:blipFill>
+        <p:spPr>
+          <a:xfrm>
+            <a:off x="3733406" y="3127266"/>
+            <a:ext cx="6096851" cy="487049"/>
+          </a:xfrm>
+          <a:prstGeom prst="rect">
+            <a:avLst/>
+          </a:prstGeom>
+        </p:spPr>
+      </p:pic>
+      <p:pic>
+        <p:nvPicPr>
+          <p:cNvPr id="18" name="Picture 17">
+            <a:extLst>
+              <a:ext uri="{FF2B5EF4-FFF2-40B4-BE49-F238E27FC236}">
+                <a16:creationId xmlns:a16="http://schemas.microsoft.com/office/drawing/2014/main" id="{1697A8DF-116F-1C82-0A10-38459FE42587}"/>
+              </a:ext>
+            </a:extLst>
+          </p:cNvPr>
+          <p:cNvPicPr>
+            <a:picLocks noChangeAspect="1"/>
+          </p:cNvPicPr>
+          <p:nvPr/>
+        </p:nvPicPr>
+        <p:blipFill rotWithShape="1">
+          <a:blip r:embed="rId5"/>
+          <a:srcRect t="86665"/>
+          <a:stretch/>
+        </p:blipFill>
+        <p:spPr>
+          <a:xfrm>
+            <a:off x="4810647" y="3621819"/>
+            <a:ext cx="6096851" cy="410323"/>
+          </a:xfrm>
+          <a:prstGeom prst="rect">
+            <a:avLst/>
+          </a:prstGeom>
+        </p:spPr>
+      </p:pic>
+      <p:pic>
+        <p:nvPicPr>
+          <p:cNvPr id="20" name="Picture 19">
+            <a:extLst>
+              <a:ext uri="{FF2B5EF4-FFF2-40B4-BE49-F238E27FC236}">
+                <a16:creationId xmlns:a16="http://schemas.microsoft.com/office/drawing/2014/main" id="{475E868F-EFEB-F9B6-6C89-3EFA31225823}"/>
+              </a:ext>
+            </a:extLst>
+          </p:cNvPr>
+          <p:cNvPicPr>
+            <a:picLocks noChangeAspect="1"/>
+          </p:cNvPicPr>
+          <p:nvPr/>
+        </p:nvPicPr>
+        <p:blipFill rotWithShape="1">
+          <a:blip r:embed="rId6"/>
+          <a:srcRect b="73612"/>
+          <a:stretch/>
+        </p:blipFill>
+        <p:spPr>
+          <a:xfrm>
+            <a:off x="3733406" y="4594877"/>
+            <a:ext cx="5115639" cy="922565"/>
+          </a:xfrm>
+          <a:prstGeom prst="rect">
+            <a:avLst/>
+          </a:prstGeom>
+        </p:spPr>
+      </p:pic>
+      <p:pic>
+        <p:nvPicPr>
+          <p:cNvPr id="22" name="Picture 21">
+            <a:extLst>
+              <a:ext uri="{FF2B5EF4-FFF2-40B4-BE49-F238E27FC236}">
+                <a16:creationId xmlns:a16="http://schemas.microsoft.com/office/drawing/2014/main" id="{97CF4C23-75C3-5D14-3C65-71BE5790B6CC}"/>
+              </a:ext>
+            </a:extLst>
+          </p:cNvPr>
+          <p:cNvPicPr>
+            <a:picLocks noChangeAspect="1"/>
+          </p:cNvPicPr>
+          <p:nvPr/>
+        </p:nvPicPr>
+        <p:blipFill rotWithShape="1">
+          <a:blip r:embed="rId6"/>
+          <a:srcRect t="88980" b="-716"/>
+          <a:stretch/>
+        </p:blipFill>
+        <p:spPr>
+          <a:xfrm>
+            <a:off x="4900255" y="5548698"/>
+            <a:ext cx="5115639" cy="410323"/>
+          </a:xfrm>
+          <a:prstGeom prst="rect">
+            <a:avLst/>
+          </a:prstGeom>
+        </p:spPr>
+      </p:pic>
+    </p:spTree>
+    <p:extLst>
+      <p:ext uri="{BB962C8B-B14F-4D97-AF65-F5344CB8AC3E}">
+        <p14:creationId xmlns:p14="http://schemas.microsoft.com/office/powerpoint/2010/main" val="2923345720"/>
+      </p:ext>
+    </p:extLst>
+  </p:cSld>
+  <p:clrMapOvr>
+    <a:masterClrMapping/>
+  </p:clrMapOvr>
+</p:sld>
+</file>
+
+<file path=ppt/slides/slide21.xml><?xml version="1.0" encoding="utf-8"?>
+<p:sld xmlns:a="http://schemas.openxmlformats.org/drawingml/2006/main" xmlns:r="http://schemas.openxmlformats.org/officeDocument/2006/relationships" xmlns:p="http://schemas.openxmlformats.org/presentationml/2006/main">
+  <p:cSld>
+    <p:spTree>
+      <p:nvGrpSpPr>
+        <p:cNvPr id="1" name=""/>
+        <p:cNvGrpSpPr/>
+        <p:nvPr/>
+      </p:nvGrpSpPr>
+      <p:grpSpPr>
+        <a:xfrm>
+          <a:off x="0" y="0"/>
+          <a:ext cx="0" cy="0"/>
+          <a:chOff x="0" y="0"/>
+          <a:chExt cx="0" cy="0"/>
+        </a:xfrm>
+      </p:grpSpPr>
+      <p:sp>
+        <p:nvSpPr>
+          <p:cNvPr id="2" name="Title 1">
+            <a:extLst>
+              <a:ext uri="{FF2B5EF4-FFF2-40B4-BE49-F238E27FC236}">
+                <a16:creationId xmlns:a16="http://schemas.microsoft.com/office/drawing/2014/main" id="{E8B8F26E-9345-4747-9094-972E38700A17}"/>
+              </a:ext>
+            </a:extLst>
+          </p:cNvPr>
+          <p:cNvSpPr>
+            <a:spLocks noGrp="1"/>
+          </p:cNvSpPr>
+          <p:nvPr>
+            <p:ph type="ctrTitle"/>
+          </p:nvPr>
+        </p:nvSpPr>
+        <p:spPr>
+          <a:xfrm rot="5400000">
+            <a:off x="-2601688" y="2601687"/>
+            <a:ext cx="6858002" cy="1654627"/>
+          </a:xfrm>
+          <a:solidFill>
+            <a:srgbClr val="3B3B3B"/>
+          </a:solidFill>
+        </p:spPr>
+        <p:txBody>
+          <a:bodyPr vert="vert270" anchor="t" anchorCtr="0"/>
+          <a:lstStyle/>
+          <a:p>
+            <a:endParaRPr lang="en-US" b="1" dirty="0">
+              <a:solidFill>
+                <a:srgbClr val="FF6600"/>
+              </a:solidFill>
+            </a:endParaRPr>
+          </a:p>
+        </p:txBody>
+      </p:sp>
+      <p:pic>
+        <p:nvPicPr>
+          <p:cNvPr id="4" name="Picture 3">
+            <a:extLst>
+              <a:ext uri="{FF2B5EF4-FFF2-40B4-BE49-F238E27FC236}">
+                <a16:creationId xmlns:a16="http://schemas.microsoft.com/office/drawing/2014/main" id="{7A465064-0714-5743-882B-8875105A7023}"/>
+              </a:ext>
+            </a:extLst>
+          </p:cNvPr>
+          <p:cNvPicPr>
+            <a:picLocks noChangeAspect="1"/>
+          </p:cNvPicPr>
+          <p:nvPr/>
+        </p:nvPicPr>
+        <p:blipFill>
+          <a:blip r:embed="rId2" cstate="print">
+            <a:extLst>
+              <a:ext uri="{28A0092B-C50C-407E-A947-70E740481C1C}">
+                <a14:useLocalDpi xmlns:a14="http://schemas.microsoft.com/office/drawing/2010/main" val="0"/>
+              </a:ext>
+            </a:extLst>
+          </a:blip>
+          <a:stretch>
+            <a:fillRect/>
+          </a:stretch>
+        </p:blipFill>
+        <p:spPr>
+          <a:xfrm>
+            <a:off x="0" y="5863771"/>
+            <a:ext cx="1654627" cy="994232"/>
+          </a:xfrm>
+          <a:prstGeom prst="rect">
+            <a:avLst/>
+          </a:prstGeom>
+        </p:spPr>
+      </p:pic>
+      <p:sp>
+        <p:nvSpPr>
+          <p:cNvPr id="6" name="Subtitle 5">
+            <a:extLst>
+              <a:ext uri="{FF2B5EF4-FFF2-40B4-BE49-F238E27FC236}">
+                <a16:creationId xmlns:a16="http://schemas.microsoft.com/office/drawing/2014/main" id="{2D4BA697-580E-5544-8F2F-194AD99B859F}"/>
+              </a:ext>
+            </a:extLst>
+          </p:cNvPr>
+          <p:cNvSpPr>
+            <a:spLocks noGrp="1"/>
+          </p:cNvSpPr>
+          <p:nvPr>
+            <p:ph type="subTitle" idx="1"/>
+          </p:nvPr>
+        </p:nvSpPr>
+        <p:spPr>
+          <a:xfrm>
+            <a:off x="1654627" y="0"/>
+            <a:ext cx="9170391" cy="1655762"/>
+          </a:xfrm>
+        </p:spPr>
+        <p:txBody>
+          <a:bodyPr>
+            <a:normAutofit/>
+          </a:bodyPr>
+          <a:lstStyle/>
+          <a:p>
+            <a:pPr algn="l"/>
+            <a:r>
+              <a:rPr lang="en-US" sz="5500" dirty="0">
+                <a:solidFill>
+                  <a:srgbClr val="FF6600"/>
+                </a:solidFill>
+              </a:rPr>
+              <a:t>Hypothesis Testing</a:t>
+            </a:r>
+          </a:p>
+          <a:p>
+            <a:pPr algn="l"/>
+            <a:endParaRPr lang="en-US" sz="6600" dirty="0">
+              <a:solidFill>
+                <a:srgbClr val="FF6600"/>
+              </a:solidFill>
+            </a:endParaRPr>
+          </a:p>
+        </p:txBody>
+      </p:sp>
+      <p:pic>
+        <p:nvPicPr>
+          <p:cNvPr id="5" name="Picture 4">
+            <a:extLst>
+              <a:ext uri="{FF2B5EF4-FFF2-40B4-BE49-F238E27FC236}">
+                <a16:creationId xmlns:a16="http://schemas.microsoft.com/office/drawing/2014/main" id="{A0671315-28BB-BBAD-BDEC-242D8FB14341}"/>
+              </a:ext>
+            </a:extLst>
+          </p:cNvPr>
+          <p:cNvPicPr>
+            <a:picLocks noChangeAspect="1"/>
+          </p:cNvPicPr>
+          <p:nvPr/>
+        </p:nvPicPr>
+        <p:blipFill rotWithShape="1">
+          <a:blip r:embed="rId3"/>
+          <a:srcRect b="73467"/>
+          <a:stretch/>
+        </p:blipFill>
+        <p:spPr>
+          <a:xfrm>
+            <a:off x="3771506" y="967004"/>
+            <a:ext cx="6677957" cy="922565"/>
+          </a:xfrm>
+          <a:prstGeom prst="rect">
+            <a:avLst/>
+          </a:prstGeom>
+        </p:spPr>
+      </p:pic>
+      <p:pic>
+        <p:nvPicPr>
+          <p:cNvPr id="9" name="Picture 8">
+            <a:extLst>
+              <a:ext uri="{FF2B5EF4-FFF2-40B4-BE49-F238E27FC236}">
+                <a16:creationId xmlns:a16="http://schemas.microsoft.com/office/drawing/2014/main" id="{7ACB8EB5-1E12-4267-2A56-55011DF83FC9}"/>
+              </a:ext>
+            </a:extLst>
+          </p:cNvPr>
+          <p:cNvPicPr>
+            <a:picLocks noChangeAspect="1"/>
+          </p:cNvPicPr>
+          <p:nvPr/>
+        </p:nvPicPr>
+        <p:blipFill rotWithShape="1">
+          <a:blip r:embed="rId3"/>
+          <a:srcRect t="88199"/>
+          <a:stretch/>
+        </p:blipFill>
+        <p:spPr>
+          <a:xfrm>
+            <a:off x="4938355" y="1920825"/>
+            <a:ext cx="6677957" cy="410323"/>
+          </a:xfrm>
+          <a:prstGeom prst="rect">
+            <a:avLst/>
+          </a:prstGeom>
+        </p:spPr>
+      </p:pic>
+      <p:pic>
+        <p:nvPicPr>
+          <p:cNvPr id="13" name="Picture 12">
+            <a:extLst>
+              <a:ext uri="{FF2B5EF4-FFF2-40B4-BE49-F238E27FC236}">
+                <a16:creationId xmlns:a16="http://schemas.microsoft.com/office/drawing/2014/main" id="{47FAB419-E7B6-B778-1B8C-0AFFCADE3B08}"/>
+              </a:ext>
+            </a:extLst>
+          </p:cNvPr>
+          <p:cNvPicPr>
+            <a:picLocks noChangeAspect="1"/>
+          </p:cNvPicPr>
+          <p:nvPr/>
+        </p:nvPicPr>
+        <p:blipFill rotWithShape="1">
+          <a:blip r:embed="rId4"/>
+          <a:srcRect b="73755"/>
+          <a:stretch/>
+        </p:blipFill>
+        <p:spPr>
+          <a:xfrm>
+            <a:off x="3771506" y="2941976"/>
+            <a:ext cx="5687219" cy="922565"/>
+          </a:xfrm>
+          <a:prstGeom prst="rect">
+            <a:avLst/>
+          </a:prstGeom>
+        </p:spPr>
+      </p:pic>
+      <p:pic>
+        <p:nvPicPr>
+          <p:cNvPr id="17" name="Picture 16">
+            <a:extLst>
+              <a:ext uri="{FF2B5EF4-FFF2-40B4-BE49-F238E27FC236}">
+                <a16:creationId xmlns:a16="http://schemas.microsoft.com/office/drawing/2014/main" id="{5BF1E3F7-9A90-9A04-2C83-4526AA050B03}"/>
+              </a:ext>
+            </a:extLst>
+          </p:cNvPr>
+          <p:cNvPicPr>
+            <a:picLocks noChangeAspect="1"/>
+          </p:cNvPicPr>
+          <p:nvPr/>
+        </p:nvPicPr>
+        <p:blipFill rotWithShape="1">
+          <a:blip r:embed="rId4"/>
+          <a:srcRect t="88327"/>
+          <a:stretch/>
+        </p:blipFill>
+        <p:spPr>
+          <a:xfrm>
+            <a:off x="4909740" y="3951333"/>
+            <a:ext cx="5687219" cy="410324"/>
+          </a:xfrm>
+          <a:prstGeom prst="rect">
+            <a:avLst/>
+          </a:prstGeom>
+        </p:spPr>
+      </p:pic>
+    </p:spTree>
+    <p:extLst>
+      <p:ext uri="{BB962C8B-B14F-4D97-AF65-F5344CB8AC3E}">
+        <p14:creationId xmlns:p14="http://schemas.microsoft.com/office/powerpoint/2010/main" val="470489858"/>
+      </p:ext>
+    </p:extLst>
+  </p:cSld>
+  <p:clrMapOvr>
+    <a:masterClrMapping/>
+  </p:clrMapOvr>
+</p:sld>
+</file>
+
+<file path=ppt/slides/slide22.xml><?xml version="1.0" encoding="utf-8"?>
+<p:sld xmlns:a="http://schemas.openxmlformats.org/drawingml/2006/main" xmlns:r="http://schemas.openxmlformats.org/officeDocument/2006/relationships" xmlns:p="http://schemas.openxmlformats.org/presentationml/2006/main">
+  <p:cSld>
+    <p:spTree>
+      <p:nvGrpSpPr>
+        <p:cNvPr id="1" name=""/>
+        <p:cNvGrpSpPr/>
+        <p:nvPr/>
+      </p:nvGrpSpPr>
+      <p:grpSpPr>
+        <a:xfrm>
+          <a:off x="0" y="0"/>
+          <a:ext cx="0" cy="0"/>
+          <a:chOff x="0" y="0"/>
+          <a:chExt cx="0" cy="0"/>
+        </a:xfrm>
+      </p:grpSpPr>
+      <p:sp>
+        <p:nvSpPr>
+          <p:cNvPr id="2" name="Title 1">
+            <a:extLst>
+              <a:ext uri="{FF2B5EF4-FFF2-40B4-BE49-F238E27FC236}">
+                <a16:creationId xmlns:a16="http://schemas.microsoft.com/office/drawing/2014/main" id="{E8B8F26E-9345-4747-9094-972E38700A17}"/>
+              </a:ext>
+            </a:extLst>
+          </p:cNvPr>
+          <p:cNvSpPr>
+            <a:spLocks noGrp="1"/>
+          </p:cNvSpPr>
+          <p:nvPr>
+            <p:ph type="ctrTitle"/>
+          </p:nvPr>
+        </p:nvSpPr>
+        <p:spPr>
+          <a:xfrm rot="5400000">
+            <a:off x="-2601688" y="2601687"/>
+            <a:ext cx="6858002" cy="1654627"/>
+          </a:xfrm>
+          <a:solidFill>
+            <a:srgbClr val="3B3B3B"/>
+          </a:solidFill>
+        </p:spPr>
+        <p:txBody>
+          <a:bodyPr vert="vert270" anchor="t" anchorCtr="0"/>
+          <a:lstStyle/>
+          <a:p>
+            <a:endParaRPr lang="en-US" b="1" dirty="0">
+              <a:solidFill>
+                <a:srgbClr val="FF6600"/>
+              </a:solidFill>
+            </a:endParaRPr>
+          </a:p>
+        </p:txBody>
+      </p:sp>
+      <p:pic>
+        <p:nvPicPr>
+          <p:cNvPr id="4" name="Picture 3">
+            <a:extLst>
+              <a:ext uri="{FF2B5EF4-FFF2-40B4-BE49-F238E27FC236}">
+                <a16:creationId xmlns:a16="http://schemas.microsoft.com/office/drawing/2014/main" id="{7A465064-0714-5743-882B-8875105A7023}"/>
+              </a:ext>
+            </a:extLst>
+          </p:cNvPr>
+          <p:cNvPicPr>
+            <a:picLocks noChangeAspect="1"/>
+          </p:cNvPicPr>
+          <p:nvPr/>
+        </p:nvPicPr>
+        <p:blipFill>
+          <a:blip r:embed="rId2" cstate="print">
+            <a:extLst>
+              <a:ext uri="{28A0092B-C50C-407E-A947-70E740481C1C}">
+                <a14:useLocalDpi xmlns:a14="http://schemas.microsoft.com/office/drawing/2010/main" val="0"/>
+              </a:ext>
+            </a:extLst>
+          </a:blip>
+          <a:stretch>
+            <a:fillRect/>
+          </a:stretch>
+        </p:blipFill>
+        <p:spPr>
+          <a:xfrm>
+            <a:off x="0" y="5863771"/>
+            <a:ext cx="1654627" cy="994232"/>
+          </a:xfrm>
+          <a:prstGeom prst="rect">
+            <a:avLst/>
+          </a:prstGeom>
+        </p:spPr>
+      </p:pic>
+      <p:sp>
+        <p:nvSpPr>
+          <p:cNvPr id="6" name="Subtitle 5">
+            <a:extLst>
+              <a:ext uri="{FF2B5EF4-FFF2-40B4-BE49-F238E27FC236}">
+                <a16:creationId xmlns:a16="http://schemas.microsoft.com/office/drawing/2014/main" id="{2D4BA697-580E-5544-8F2F-194AD99B859F}"/>
+              </a:ext>
+            </a:extLst>
+          </p:cNvPr>
+          <p:cNvSpPr>
+            <a:spLocks noGrp="1"/>
+          </p:cNvSpPr>
+          <p:nvPr>
+            <p:ph type="subTitle" idx="1"/>
+          </p:nvPr>
+        </p:nvSpPr>
+        <p:spPr>
+          <a:xfrm>
+            <a:off x="1654627" y="0"/>
+            <a:ext cx="9170391" cy="1655762"/>
+          </a:xfrm>
+        </p:spPr>
+        <p:txBody>
+          <a:bodyPr>
+            <a:normAutofit/>
+          </a:bodyPr>
+          <a:lstStyle/>
+          <a:p>
+            <a:pPr algn="l"/>
+            <a:r>
+              <a:rPr lang="en-US" sz="5500" dirty="0">
+                <a:solidFill>
+                  <a:srgbClr val="FF6600"/>
+                </a:solidFill>
+              </a:rPr>
+              <a:t>EDA Summary</a:t>
+            </a:r>
+          </a:p>
+          <a:p>
+            <a:pPr algn="l"/>
+            <a:endParaRPr lang="en-US" sz="6600" dirty="0">
+              <a:solidFill>
+                <a:srgbClr val="FF6600"/>
+              </a:solidFill>
+            </a:endParaRPr>
+          </a:p>
+        </p:txBody>
+      </p:sp>
+      <p:sp>
+        <p:nvSpPr>
+          <p:cNvPr id="3" name="TextBox 2">
+            <a:extLst>
+              <a:ext uri="{FF2B5EF4-FFF2-40B4-BE49-F238E27FC236}">
+                <a16:creationId xmlns:a16="http://schemas.microsoft.com/office/drawing/2014/main" id="{485E03B5-BDEE-A0F8-7D7A-B5089C338D40}"/>
+              </a:ext>
+            </a:extLst>
+          </p:cNvPr>
+          <p:cNvSpPr txBox="1"/>
+          <p:nvPr/>
+        </p:nvSpPr>
+        <p:spPr>
+          <a:xfrm>
+            <a:off x="2824227" y="2295669"/>
+            <a:ext cx="3271773" cy="4650632"/>
+          </a:xfrm>
+          <a:prstGeom prst="rect">
+            <a:avLst/>
+          </a:prstGeom>
+          <a:noFill/>
+        </p:spPr>
+        <p:txBody>
+          <a:bodyPr wrap="square" rtlCol="0">
+            <a:spAutoFit/>
+          </a:bodyPr>
+          <a:lstStyle/>
+          <a:p>
+            <a:pPr marL="285750" indent="-285750" algn="l">
+              <a:buFont typeface="Arial" panose="020B0604020202020204" pitchFamily="34" charset="0"/>
+              <a:buChar char="•"/>
+            </a:pPr>
+            <a:r>
+              <a:rPr lang="en-CA" sz="1600" i="0" dirty="0">
+                <a:solidFill>
+                  <a:srgbClr val="000000"/>
+                </a:solidFill>
+                <a:effectLst/>
+                <a:latin typeface="var(--jp-content-font-family)"/>
+              </a:rPr>
+              <a:t>Monthly transaction range from 3,000 to 12,000.</a:t>
+            </a:r>
+          </a:p>
+          <a:p>
+            <a:pPr marL="285750" indent="-285750" algn="l">
+              <a:lnSpc>
+                <a:spcPct val="150000"/>
+              </a:lnSpc>
+              <a:buFont typeface="Arial" panose="020B0604020202020204" pitchFamily="34" charset="0"/>
+              <a:buChar char="•"/>
+            </a:pPr>
+            <a:r>
+              <a:rPr lang="en-CA" sz="1600" i="0" dirty="0">
+                <a:solidFill>
+                  <a:srgbClr val="000000"/>
+                </a:solidFill>
+                <a:effectLst/>
+                <a:latin typeface="-apple-system"/>
+              </a:rPr>
+              <a:t>Majority of distance travelled are the same for both company (range from 12 KM to 33 KM)</a:t>
+            </a:r>
+          </a:p>
+          <a:p>
+            <a:pPr marL="285750" indent="-285750" algn="l">
+              <a:lnSpc>
+                <a:spcPct val="150000"/>
+              </a:lnSpc>
+              <a:buFont typeface="Arial" panose="020B0604020202020204" pitchFamily="34" charset="0"/>
+              <a:buChar char="•"/>
+            </a:pPr>
+            <a:r>
+              <a:rPr lang="en-CA" sz="1600" dirty="0">
+                <a:solidFill>
+                  <a:srgbClr val="000000"/>
+                </a:solidFill>
+                <a:latin typeface="-apple-system"/>
+              </a:rPr>
+              <a:t>Yearly profit of around 2 Million</a:t>
+            </a:r>
+          </a:p>
+          <a:p>
+            <a:pPr marL="285750" indent="-285750" algn="l">
+              <a:lnSpc>
+                <a:spcPct val="150000"/>
+              </a:lnSpc>
+              <a:buFont typeface="Arial" panose="020B0604020202020204" pitchFamily="34" charset="0"/>
+              <a:buChar char="•"/>
+            </a:pPr>
+            <a:r>
+              <a:rPr lang="en-CA" sz="1600" i="0" dirty="0">
+                <a:solidFill>
+                  <a:srgbClr val="000000"/>
+                </a:solidFill>
+                <a:effectLst/>
+                <a:latin typeface="-apple-system"/>
+              </a:rPr>
+              <a:t>More transactions in Los Angeles</a:t>
+            </a:r>
+            <a:r>
+              <a:rPr lang="en-CA" sz="1600" dirty="0">
+                <a:solidFill>
+                  <a:srgbClr val="000000"/>
+                </a:solidFill>
+                <a:latin typeface="-apple-system"/>
+              </a:rPr>
+              <a:t>, New York, and San Diego</a:t>
+            </a:r>
+          </a:p>
+          <a:p>
+            <a:pPr marL="285750" indent="-285750" algn="l">
+              <a:lnSpc>
+                <a:spcPct val="150000"/>
+              </a:lnSpc>
+              <a:buFont typeface="Arial" panose="020B0604020202020204" pitchFamily="34" charset="0"/>
+              <a:buChar char="•"/>
+            </a:pPr>
+            <a:r>
+              <a:rPr lang="en-CA" sz="1600" i="0" dirty="0">
+                <a:solidFill>
+                  <a:srgbClr val="000000"/>
+                </a:solidFill>
+                <a:effectLst/>
+                <a:latin typeface="-apple-system"/>
+              </a:rPr>
+              <a:t>Age group range from 18 to 65 year old, majority from 18 to 40</a:t>
+            </a:r>
+          </a:p>
+          <a:p>
+            <a:pPr marL="285750" indent="-285750" algn="l">
+              <a:lnSpc>
+                <a:spcPct val="150000"/>
+              </a:lnSpc>
+              <a:buFont typeface="Arial" panose="020B0604020202020204" pitchFamily="34" charset="0"/>
+              <a:buChar char="•"/>
+            </a:pPr>
+            <a:r>
+              <a:rPr lang="en-CA" sz="1600" dirty="0">
+                <a:solidFill>
+                  <a:srgbClr val="000000"/>
+                </a:solidFill>
+                <a:latin typeface="-apple-system"/>
+              </a:rPr>
+              <a:t>Around 44.2% female and 55.8% male</a:t>
+            </a:r>
+            <a:br>
+              <a:rPr lang="en-CA" i="0" dirty="0">
+                <a:solidFill>
+                  <a:srgbClr val="000000"/>
+                </a:solidFill>
+                <a:effectLst/>
+                <a:latin typeface="-apple-system"/>
+              </a:rPr>
+            </a:br>
+            <a:endParaRPr lang="en-CA" i="0" dirty="0">
+              <a:effectLst/>
+              <a:latin typeface="-apple-system"/>
+            </a:endParaRPr>
+          </a:p>
+        </p:txBody>
+      </p:sp>
+      <p:pic>
+        <p:nvPicPr>
+          <p:cNvPr id="7" name="Picture 2" descr="Pink Taxi Vector Images (over 610)">
+            <a:extLst>
+              <a:ext uri="{FF2B5EF4-FFF2-40B4-BE49-F238E27FC236}">
+                <a16:creationId xmlns:a16="http://schemas.microsoft.com/office/drawing/2014/main" id="{6C1ED098-645E-2972-D11F-95C404249A61}"/>
+              </a:ext>
+            </a:extLst>
+          </p:cNvPr>
+          <p:cNvPicPr>
+            <a:picLocks noChangeAspect="1" noChangeArrowheads="1"/>
+          </p:cNvPicPr>
+          <p:nvPr/>
+        </p:nvPicPr>
+        <p:blipFill rotWithShape="1">
+          <a:blip r:embed="rId3">
+            <a:extLst>
+              <a:ext uri="{28A0092B-C50C-407E-A947-70E740481C1C}">
+                <a14:useLocalDpi xmlns:a14="http://schemas.microsoft.com/office/drawing/2010/main" val="0"/>
+              </a:ext>
+            </a:extLst>
+          </a:blip>
+          <a:srcRect l="3079" t="26809" r="-3079" b="50228"/>
+          <a:stretch/>
+        </p:blipFill>
+        <p:spPr bwMode="auto">
+          <a:xfrm>
+            <a:off x="2557461" y="858982"/>
+            <a:ext cx="4135697" cy="997527"/>
+          </a:xfrm>
+          <a:prstGeom prst="rect">
+            <a:avLst/>
+          </a:prstGeom>
+          <a:noFill/>
+          <a:extLst>
+            <a:ext uri="{909E8E84-426E-40DD-AFC4-6F175D3DCCD1}">
+              <a14:hiddenFill xmlns:a14="http://schemas.microsoft.com/office/drawing/2010/main">
+                <a:solidFill>
+                  <a:srgbClr val="FFFFFF"/>
+                </a:solidFill>
+              </a14:hiddenFill>
+            </a:ext>
+          </a:extLst>
+        </p:spPr>
+      </p:pic>
+      <p:pic>
+        <p:nvPicPr>
+          <p:cNvPr id="9" name="Picture 4" descr="Pink Taxi Vector Images (over 610)">
+            <a:extLst>
+              <a:ext uri="{FF2B5EF4-FFF2-40B4-BE49-F238E27FC236}">
+                <a16:creationId xmlns:a16="http://schemas.microsoft.com/office/drawing/2014/main" id="{BB80135C-0A63-A613-42C2-E8B3EC76A616}"/>
+              </a:ext>
+            </a:extLst>
+          </p:cNvPr>
+          <p:cNvPicPr>
+            <a:picLocks noChangeAspect="1" noChangeArrowheads="1"/>
+          </p:cNvPicPr>
+          <p:nvPr/>
+        </p:nvPicPr>
+        <p:blipFill rotWithShape="1">
+          <a:blip r:embed="rId3">
+            <a:extLst>
+              <a:ext uri="{28A0092B-C50C-407E-A947-70E740481C1C}">
+                <a14:useLocalDpi xmlns:a14="http://schemas.microsoft.com/office/drawing/2010/main" val="0"/>
+              </a:ext>
+            </a:extLst>
+          </a:blip>
+          <a:srcRect l="521" t="2572" r="-521" b="73862"/>
+          <a:stretch/>
+        </p:blipFill>
+        <p:spPr bwMode="auto">
+          <a:xfrm>
+            <a:off x="7197724" y="858982"/>
+            <a:ext cx="4070639" cy="1007654"/>
+          </a:xfrm>
+          <a:prstGeom prst="rect">
+            <a:avLst/>
+          </a:prstGeom>
+          <a:noFill/>
+          <a:extLst>
+            <a:ext uri="{909E8E84-426E-40DD-AFC4-6F175D3DCCD1}">
+              <a14:hiddenFill xmlns:a14="http://schemas.microsoft.com/office/drawing/2010/main">
+                <a:solidFill>
+                  <a:srgbClr val="FFFFFF"/>
+                </a:solidFill>
+              </a14:hiddenFill>
+            </a:ext>
+          </a:extLst>
+        </p:spPr>
+      </p:pic>
+      <p:sp>
+        <p:nvSpPr>
+          <p:cNvPr id="10" name="TextBox 9">
+            <a:extLst>
+              <a:ext uri="{FF2B5EF4-FFF2-40B4-BE49-F238E27FC236}">
+                <a16:creationId xmlns:a16="http://schemas.microsoft.com/office/drawing/2014/main" id="{05BB08B8-B76D-9427-A8DE-03A84859CBB5}"/>
+              </a:ext>
+            </a:extLst>
+          </p:cNvPr>
+          <p:cNvSpPr txBox="1"/>
+          <p:nvPr/>
+        </p:nvSpPr>
+        <p:spPr>
+          <a:xfrm>
+            <a:off x="6483927" y="1152627"/>
+            <a:ext cx="916997" cy="400110"/>
+          </a:xfrm>
+          <a:prstGeom prst="rect">
+            <a:avLst/>
+          </a:prstGeom>
+          <a:noFill/>
+        </p:spPr>
+        <p:txBody>
+          <a:bodyPr wrap="square" rtlCol="0">
+            <a:spAutoFit/>
+          </a:bodyPr>
+          <a:lstStyle/>
+          <a:p>
+            <a:r>
+              <a:rPr lang="en-CA" sz="2000" b="1" dirty="0"/>
+              <a:t>VS</a:t>
+            </a:r>
+          </a:p>
+        </p:txBody>
+      </p:sp>
+      <mc:AlternateContent xmlns:mc="http://schemas.openxmlformats.org/markup-compatibility/2006" xmlns:p14="http://schemas.microsoft.com/office/powerpoint/2010/main">
+        <mc:Choice Requires="p14">
+          <p:contentPart p14:bwMode="auto" r:id="rId4">
+            <p14:nvContentPartPr>
+              <p14:cNvPr id="18" name="Ink 17">
+                <a:extLst>
+                  <a:ext uri="{FF2B5EF4-FFF2-40B4-BE49-F238E27FC236}">
+                    <a16:creationId xmlns:a16="http://schemas.microsoft.com/office/drawing/2014/main" id="{25C79C3C-6019-9B9B-81CB-15E71E60C2DA}"/>
+                  </a:ext>
+                </a:extLst>
+              </p14:cNvPr>
+              <p14:cNvContentPartPr/>
+              <p14:nvPr/>
+            </p14:nvContentPartPr>
+            <p14:xfrm>
+              <a:off x="6732750" y="2037870"/>
+              <a:ext cx="360" cy="4429605"/>
+            </p14:xfrm>
+          </p:contentPart>
+        </mc:Choice>
+        <mc:Fallback xmlns="">
+          <p:pic>
+            <p:nvPicPr>
+              <p:cNvPr id="18" name="Ink 17">
+                <a:extLst>
+                  <a:ext uri="{FF2B5EF4-FFF2-40B4-BE49-F238E27FC236}">
+                    <a16:creationId xmlns:a16="http://schemas.microsoft.com/office/drawing/2014/main" id="{25C79C3C-6019-9B9B-81CB-15E71E60C2DA}"/>
+                  </a:ext>
+                </a:extLst>
+              </p:cNvPr>
+              <p:cNvPicPr/>
+              <p:nvPr/>
+            </p:nvPicPr>
+            <p:blipFill>
+              <a:blip r:embed="rId5"/>
+              <a:stretch>
+                <a:fillRect/>
+              </a:stretch>
+            </p:blipFill>
+            <p:spPr>
+              <a:xfrm>
+                <a:off x="6723750" y="2028870"/>
+                <a:ext cx="18000" cy="4447246"/>
+              </a:xfrm>
+              <a:prstGeom prst="rect">
+                <a:avLst/>
+              </a:prstGeom>
+            </p:spPr>
+          </p:pic>
+        </mc:Fallback>
+      </mc:AlternateContent>
+      <p:sp>
+        <p:nvSpPr>
+          <p:cNvPr id="19" name="TextBox 18">
+            <a:extLst>
+              <a:ext uri="{FF2B5EF4-FFF2-40B4-BE49-F238E27FC236}">
+                <a16:creationId xmlns:a16="http://schemas.microsoft.com/office/drawing/2014/main" id="{342C435B-EA03-CC11-EFB3-F18CB1414071}"/>
+              </a:ext>
+            </a:extLst>
+          </p:cNvPr>
+          <p:cNvSpPr txBox="1"/>
+          <p:nvPr/>
+        </p:nvSpPr>
+        <p:spPr>
+          <a:xfrm>
+            <a:off x="7472427" y="2295669"/>
+            <a:ext cx="3271773" cy="4650632"/>
+          </a:xfrm>
+          <a:prstGeom prst="rect">
+            <a:avLst/>
+          </a:prstGeom>
+          <a:noFill/>
+        </p:spPr>
+        <p:txBody>
+          <a:bodyPr wrap="square" rtlCol="0">
+            <a:spAutoFit/>
+          </a:bodyPr>
+          <a:lstStyle/>
+          <a:p>
+            <a:pPr marL="285750" indent="-285750" algn="l">
+              <a:buFont typeface="Arial" panose="020B0604020202020204" pitchFamily="34" charset="0"/>
+              <a:buChar char="•"/>
+            </a:pPr>
+            <a:r>
+              <a:rPr lang="en-CA" sz="1600" i="0" dirty="0">
+                <a:solidFill>
+                  <a:srgbClr val="000000"/>
+                </a:solidFill>
+                <a:effectLst/>
+                <a:latin typeface="var(--jp-content-font-family)"/>
+              </a:rPr>
+              <a:t>Monthly transaction range from 15,000 to 35,000.</a:t>
+            </a:r>
+          </a:p>
+          <a:p>
+            <a:pPr marL="285750" indent="-285750" algn="l">
+              <a:lnSpc>
+                <a:spcPct val="150000"/>
+              </a:lnSpc>
+              <a:buFont typeface="Arial" panose="020B0604020202020204" pitchFamily="34" charset="0"/>
+              <a:buChar char="•"/>
+            </a:pPr>
+            <a:r>
+              <a:rPr lang="en-CA" sz="1600" i="0" dirty="0">
+                <a:solidFill>
+                  <a:srgbClr val="000000"/>
+                </a:solidFill>
+                <a:effectLst/>
+                <a:latin typeface="-apple-system"/>
+              </a:rPr>
+              <a:t>Majority of distance travelled are the same for both company (range from 12 KM to 33 KM)</a:t>
+            </a:r>
+          </a:p>
+          <a:p>
+            <a:pPr marL="285750" indent="-285750" algn="l">
+              <a:lnSpc>
+                <a:spcPct val="150000"/>
+              </a:lnSpc>
+              <a:buFont typeface="Arial" panose="020B0604020202020204" pitchFamily="34" charset="0"/>
+              <a:buChar char="•"/>
+            </a:pPr>
+            <a:r>
+              <a:rPr lang="en-CA" sz="1600" dirty="0">
+                <a:solidFill>
+                  <a:srgbClr val="000000"/>
+                </a:solidFill>
+                <a:latin typeface="-apple-system"/>
+              </a:rPr>
+              <a:t>Yearly profit of 14 to 16.5 Million</a:t>
+            </a:r>
+          </a:p>
+          <a:p>
+            <a:pPr marL="285750" indent="-285750" algn="l">
+              <a:lnSpc>
+                <a:spcPct val="150000"/>
+              </a:lnSpc>
+              <a:buFont typeface="Arial" panose="020B0604020202020204" pitchFamily="34" charset="0"/>
+              <a:buChar char="•"/>
+            </a:pPr>
+            <a:r>
+              <a:rPr kumimoji="0" lang="en-CA" sz="1600" b="0" i="0" u="none" strike="noStrike" kern="1200" cap="none" spc="0" normalizeH="0" baseline="0" noProof="0" dirty="0">
+                <a:ln>
+                  <a:noFill/>
+                </a:ln>
+                <a:solidFill>
+                  <a:srgbClr val="000000"/>
+                </a:solidFill>
+                <a:effectLst/>
+                <a:uLnTx/>
+                <a:uFillTx/>
+                <a:latin typeface="-apple-system"/>
+                <a:ea typeface="+mn-ea"/>
+                <a:cs typeface="+mn-cs"/>
+              </a:rPr>
+              <a:t>More transactions in New York, Chicago and Washington</a:t>
+            </a:r>
+          </a:p>
+          <a:p>
+            <a:pPr marL="285750" indent="-285750" algn="l">
+              <a:lnSpc>
+                <a:spcPct val="150000"/>
+              </a:lnSpc>
+              <a:buFont typeface="Arial" panose="020B0604020202020204" pitchFamily="34" charset="0"/>
+              <a:buChar char="•"/>
+            </a:pPr>
+            <a:r>
+              <a:rPr kumimoji="0" lang="en-CA" sz="1600" b="0" i="0" u="none" strike="noStrike" kern="1200" cap="none" spc="0" normalizeH="0" baseline="0" noProof="0" dirty="0">
+                <a:ln>
+                  <a:noFill/>
+                </a:ln>
+                <a:solidFill>
+                  <a:srgbClr val="000000"/>
+                </a:solidFill>
+                <a:effectLst/>
+                <a:uLnTx/>
+                <a:uFillTx/>
+                <a:latin typeface="-apple-system"/>
+                <a:ea typeface="+mn-ea"/>
+                <a:cs typeface="+mn-cs"/>
+              </a:rPr>
+              <a:t>Age group range from 18 to 65 year old, majority from 18 to 40</a:t>
+            </a:r>
+          </a:p>
+          <a:p>
+            <a:pPr marL="285750" indent="-285750" algn="l">
+              <a:lnSpc>
+                <a:spcPct val="150000"/>
+              </a:lnSpc>
+              <a:buFont typeface="Arial" panose="020B0604020202020204" pitchFamily="34" charset="0"/>
+              <a:buChar char="•"/>
+            </a:pPr>
+            <a:r>
+              <a:rPr kumimoji="0" lang="en-CA" sz="1600" b="0" i="0" u="none" strike="noStrike" kern="1200" cap="none" spc="0" normalizeH="0" baseline="0" noProof="0" dirty="0">
+                <a:ln>
+                  <a:noFill/>
+                </a:ln>
+                <a:solidFill>
+                  <a:srgbClr val="000000"/>
+                </a:solidFill>
+                <a:effectLst/>
+                <a:uLnTx/>
+                <a:uFillTx/>
+                <a:latin typeface="-apple-system"/>
+                <a:ea typeface="+mn-ea"/>
+                <a:cs typeface="+mn-cs"/>
+              </a:rPr>
+              <a:t>Around 42.2% female and 57.8% male</a:t>
+            </a:r>
+            <a:br>
+              <a:rPr lang="en-CA" i="0" dirty="0">
+                <a:solidFill>
+                  <a:srgbClr val="000000"/>
+                </a:solidFill>
+                <a:effectLst/>
+                <a:latin typeface="-apple-system"/>
+              </a:rPr>
+            </a:br>
+            <a:endParaRPr lang="en-CA" i="0" dirty="0">
+              <a:effectLst/>
+              <a:latin typeface="-apple-system"/>
+            </a:endParaRPr>
+          </a:p>
+        </p:txBody>
+      </p:sp>
+    </p:spTree>
+    <p:extLst>
+      <p:ext uri="{BB962C8B-B14F-4D97-AF65-F5344CB8AC3E}">
+        <p14:creationId xmlns:p14="http://schemas.microsoft.com/office/powerpoint/2010/main" val="2042423282"/>
+      </p:ext>
+    </p:extLst>
+  </p:cSld>
+  <p:clrMapOvr>
+    <a:masterClrMapping/>
+  </p:clrMapOvr>
+</p:sld>
+</file>
+
+<file path=ppt/slides/slide23.xml><?xml version="1.0" encoding="utf-8"?>
+<p:sld xmlns:a="http://schemas.openxmlformats.org/drawingml/2006/main" xmlns:r="http://schemas.openxmlformats.org/officeDocument/2006/relationships" xmlns:p="http://schemas.openxmlformats.org/presentationml/2006/main">
+  <p:cSld>
+    <p:spTree>
+      <p:nvGrpSpPr>
+        <p:cNvPr id="1" name=""/>
+        <p:cNvGrpSpPr/>
+        <p:nvPr/>
+      </p:nvGrpSpPr>
+      <p:grpSpPr>
+        <a:xfrm>
+          <a:off x="0" y="0"/>
+          <a:ext cx="0" cy="0"/>
+          <a:chOff x="0" y="0"/>
+          <a:chExt cx="0" cy="0"/>
+        </a:xfrm>
+      </p:grpSpPr>
+      <p:sp>
+        <p:nvSpPr>
+          <p:cNvPr id="2" name="Title 1">
+            <a:extLst>
+              <a:ext uri="{FF2B5EF4-FFF2-40B4-BE49-F238E27FC236}">
+                <a16:creationId xmlns:a16="http://schemas.microsoft.com/office/drawing/2014/main" id="{E8B8F26E-9345-4747-9094-972E38700A17}"/>
+              </a:ext>
+            </a:extLst>
+          </p:cNvPr>
+          <p:cNvSpPr>
+            <a:spLocks noGrp="1"/>
+          </p:cNvSpPr>
+          <p:nvPr>
+            <p:ph type="ctrTitle"/>
+          </p:nvPr>
+        </p:nvSpPr>
+        <p:spPr>
+          <a:xfrm rot="5400000">
+            <a:off x="-2601688" y="2601687"/>
+            <a:ext cx="6858002" cy="1654627"/>
+          </a:xfrm>
+          <a:solidFill>
+            <a:srgbClr val="3B3B3B"/>
+          </a:solidFill>
+        </p:spPr>
+        <p:txBody>
+          <a:bodyPr vert="vert270" anchor="t" anchorCtr="0"/>
+          <a:lstStyle/>
+          <a:p>
+            <a:endParaRPr lang="en-US" b="1" dirty="0">
+              <a:solidFill>
+                <a:srgbClr val="FF6600"/>
+              </a:solidFill>
+            </a:endParaRPr>
+          </a:p>
+        </p:txBody>
+      </p:sp>
+      <p:pic>
+        <p:nvPicPr>
+          <p:cNvPr id="4" name="Picture 3">
+            <a:extLst>
+              <a:ext uri="{FF2B5EF4-FFF2-40B4-BE49-F238E27FC236}">
+                <a16:creationId xmlns:a16="http://schemas.microsoft.com/office/drawing/2014/main" id="{7A465064-0714-5743-882B-8875105A7023}"/>
+              </a:ext>
+            </a:extLst>
+          </p:cNvPr>
+          <p:cNvPicPr>
+            <a:picLocks noChangeAspect="1"/>
+          </p:cNvPicPr>
+          <p:nvPr/>
+        </p:nvPicPr>
+        <p:blipFill>
+          <a:blip r:embed="rId2" cstate="print">
+            <a:extLst>
+              <a:ext uri="{28A0092B-C50C-407E-A947-70E740481C1C}">
+                <a14:useLocalDpi xmlns:a14="http://schemas.microsoft.com/office/drawing/2010/main" val="0"/>
+              </a:ext>
+            </a:extLst>
+          </a:blip>
+          <a:stretch>
+            <a:fillRect/>
+          </a:stretch>
+        </p:blipFill>
+        <p:spPr>
+          <a:xfrm>
+            <a:off x="0" y="5863771"/>
+            <a:ext cx="1654627" cy="994232"/>
+          </a:xfrm>
+          <a:prstGeom prst="rect">
+            <a:avLst/>
+          </a:prstGeom>
+        </p:spPr>
+      </p:pic>
+      <p:sp>
+        <p:nvSpPr>
+          <p:cNvPr id="6" name="Subtitle 5">
+            <a:extLst>
+              <a:ext uri="{FF2B5EF4-FFF2-40B4-BE49-F238E27FC236}">
+                <a16:creationId xmlns:a16="http://schemas.microsoft.com/office/drawing/2014/main" id="{2D4BA697-580E-5544-8F2F-194AD99B859F}"/>
+              </a:ext>
+            </a:extLst>
+          </p:cNvPr>
+          <p:cNvSpPr>
+            <a:spLocks noGrp="1"/>
+          </p:cNvSpPr>
+          <p:nvPr>
+            <p:ph type="subTitle" idx="1"/>
+          </p:nvPr>
+        </p:nvSpPr>
+        <p:spPr>
+          <a:xfrm>
+            <a:off x="1654627" y="0"/>
+            <a:ext cx="9170391" cy="1655762"/>
+          </a:xfrm>
+        </p:spPr>
+        <p:txBody>
+          <a:bodyPr>
+            <a:normAutofit/>
+          </a:bodyPr>
+          <a:lstStyle/>
+          <a:p>
+            <a:pPr algn="l"/>
+            <a:r>
+              <a:rPr lang="en-US" sz="5500" dirty="0">
+                <a:solidFill>
+                  <a:srgbClr val="FF6600"/>
+                </a:solidFill>
+              </a:rPr>
+              <a:t>EDA Summary</a:t>
+            </a:r>
+          </a:p>
+          <a:p>
+            <a:pPr algn="l"/>
+            <a:endParaRPr lang="en-US" sz="6600" dirty="0">
+              <a:solidFill>
+                <a:srgbClr val="FF6600"/>
+              </a:solidFill>
+            </a:endParaRPr>
+          </a:p>
+        </p:txBody>
+      </p:sp>
+      <p:sp>
+        <p:nvSpPr>
+          <p:cNvPr id="3" name="TextBox 2">
+            <a:extLst>
+              <a:ext uri="{FF2B5EF4-FFF2-40B4-BE49-F238E27FC236}">
+                <a16:creationId xmlns:a16="http://schemas.microsoft.com/office/drawing/2014/main" id="{485E03B5-BDEE-A0F8-7D7A-B5089C338D40}"/>
+              </a:ext>
+            </a:extLst>
+          </p:cNvPr>
+          <p:cNvSpPr txBox="1"/>
+          <p:nvPr/>
+        </p:nvSpPr>
+        <p:spPr>
+          <a:xfrm>
+            <a:off x="2824227" y="2295669"/>
+            <a:ext cx="3271773" cy="4158190"/>
+          </a:xfrm>
+          <a:prstGeom prst="rect">
+            <a:avLst/>
+          </a:prstGeom>
+          <a:noFill/>
+        </p:spPr>
+        <p:txBody>
+          <a:bodyPr wrap="square" rtlCol="0">
+            <a:spAutoFit/>
+          </a:bodyPr>
+          <a:lstStyle/>
+          <a:p>
+            <a:pPr marL="285750" indent="-285750" algn="l">
+              <a:lnSpc>
+                <a:spcPct val="150000"/>
+              </a:lnSpc>
+              <a:buFont typeface="Arial" panose="020B0604020202020204" pitchFamily="34" charset="0"/>
+              <a:buChar char="•"/>
+            </a:pPr>
+            <a:r>
+              <a:rPr lang="en-CA" sz="1600" dirty="0">
+                <a:solidFill>
+                  <a:srgbClr val="000000"/>
+                </a:solidFill>
+                <a:latin typeface="-apple-system"/>
+              </a:rPr>
+              <a:t>Around 59.9% uses card and 40.1% uses cash to pay</a:t>
+            </a:r>
+          </a:p>
+          <a:p>
+            <a:pPr marL="285750" indent="-285750" algn="l">
+              <a:lnSpc>
+                <a:spcPct val="150000"/>
+              </a:lnSpc>
+              <a:buFont typeface="Arial" panose="020B0604020202020204" pitchFamily="34" charset="0"/>
+              <a:buChar char="•"/>
+            </a:pPr>
+            <a:r>
+              <a:rPr lang="en-CA" sz="1600" i="0" dirty="0">
+                <a:solidFill>
+                  <a:srgbClr val="000000"/>
+                </a:solidFill>
+                <a:effectLst/>
+                <a:latin typeface="-apple-system"/>
+              </a:rPr>
+              <a:t>Less profit per distance then Yellow Cab</a:t>
+            </a:r>
+          </a:p>
+          <a:p>
+            <a:pPr marL="285750" indent="-285750" algn="l">
+              <a:lnSpc>
+                <a:spcPct val="150000"/>
+              </a:lnSpc>
+              <a:buFont typeface="Arial" panose="020B0604020202020204" pitchFamily="34" charset="0"/>
+              <a:buChar char="•"/>
+            </a:pPr>
+            <a:r>
+              <a:rPr lang="en-CA" sz="1600" i="0" dirty="0">
+                <a:solidFill>
+                  <a:srgbClr val="000000"/>
+                </a:solidFill>
+                <a:effectLst/>
+                <a:latin typeface="-apple-system"/>
+              </a:rPr>
+              <a:t>Less profit per price charged then Yellow Cab </a:t>
+            </a:r>
+          </a:p>
+          <a:p>
+            <a:pPr marL="285750" indent="-285750" algn="l">
+              <a:lnSpc>
+                <a:spcPct val="150000"/>
+              </a:lnSpc>
+              <a:buFont typeface="Arial" panose="020B0604020202020204" pitchFamily="34" charset="0"/>
+              <a:buChar char="•"/>
+            </a:pPr>
+            <a:r>
+              <a:rPr lang="en-CA" sz="1600" i="0" dirty="0">
+                <a:solidFill>
+                  <a:srgbClr val="000000"/>
+                </a:solidFill>
+                <a:effectLst/>
+                <a:latin typeface="-apple-system"/>
+              </a:rPr>
+              <a:t>Charge</a:t>
+            </a:r>
+            <a:r>
+              <a:rPr lang="en-CA" sz="1600" dirty="0">
+                <a:solidFill>
+                  <a:srgbClr val="000000"/>
+                </a:solidFill>
+                <a:latin typeface="-apple-system"/>
+              </a:rPr>
+              <a:t> less per distance then Yellow Cab</a:t>
+            </a:r>
+          </a:p>
+          <a:p>
+            <a:pPr marL="285750" indent="-285750" algn="l">
+              <a:lnSpc>
+                <a:spcPct val="150000"/>
+              </a:lnSpc>
+              <a:buFont typeface="Arial" panose="020B0604020202020204" pitchFamily="34" charset="0"/>
+              <a:buChar char="•"/>
+            </a:pPr>
+            <a:r>
+              <a:rPr lang="en-CA" sz="1600" i="0" dirty="0">
+                <a:solidFill>
+                  <a:srgbClr val="000000"/>
+                </a:solidFill>
+                <a:effectLst/>
+                <a:latin typeface="-apple-system"/>
+              </a:rPr>
+              <a:t>1/8 time</a:t>
+            </a:r>
+            <a:r>
+              <a:rPr lang="en-CA" sz="1600" dirty="0">
+                <a:solidFill>
+                  <a:srgbClr val="000000"/>
+                </a:solidFill>
+                <a:latin typeface="-apple-system"/>
+              </a:rPr>
+              <a:t>s the total profit of Yellow Cab </a:t>
+            </a:r>
+            <a:br>
+              <a:rPr lang="en-CA" i="0" dirty="0">
+                <a:solidFill>
+                  <a:srgbClr val="000000"/>
+                </a:solidFill>
+                <a:effectLst/>
+                <a:latin typeface="-apple-system"/>
+              </a:rPr>
+            </a:br>
+            <a:endParaRPr lang="en-CA" i="0" dirty="0">
+              <a:effectLst/>
+              <a:latin typeface="-apple-system"/>
+            </a:endParaRPr>
+          </a:p>
+        </p:txBody>
+      </p:sp>
+      <p:pic>
+        <p:nvPicPr>
+          <p:cNvPr id="7" name="Picture 2" descr="Pink Taxi Vector Images (over 610)">
+            <a:extLst>
+              <a:ext uri="{FF2B5EF4-FFF2-40B4-BE49-F238E27FC236}">
+                <a16:creationId xmlns:a16="http://schemas.microsoft.com/office/drawing/2014/main" id="{6C1ED098-645E-2972-D11F-95C404249A61}"/>
+              </a:ext>
+            </a:extLst>
+          </p:cNvPr>
+          <p:cNvPicPr>
+            <a:picLocks noChangeAspect="1" noChangeArrowheads="1"/>
+          </p:cNvPicPr>
+          <p:nvPr/>
+        </p:nvPicPr>
+        <p:blipFill rotWithShape="1">
+          <a:blip r:embed="rId3">
+            <a:extLst>
+              <a:ext uri="{28A0092B-C50C-407E-A947-70E740481C1C}">
+                <a14:useLocalDpi xmlns:a14="http://schemas.microsoft.com/office/drawing/2010/main" val="0"/>
+              </a:ext>
+            </a:extLst>
+          </a:blip>
+          <a:srcRect l="3079" t="26809" r="-3079" b="50228"/>
+          <a:stretch/>
+        </p:blipFill>
+        <p:spPr bwMode="auto">
+          <a:xfrm>
+            <a:off x="2557461" y="858982"/>
+            <a:ext cx="4135697" cy="997527"/>
+          </a:xfrm>
+          <a:prstGeom prst="rect">
+            <a:avLst/>
+          </a:prstGeom>
+          <a:noFill/>
+          <a:extLst>
+            <a:ext uri="{909E8E84-426E-40DD-AFC4-6F175D3DCCD1}">
+              <a14:hiddenFill xmlns:a14="http://schemas.microsoft.com/office/drawing/2010/main">
+                <a:solidFill>
+                  <a:srgbClr val="FFFFFF"/>
+                </a:solidFill>
+              </a14:hiddenFill>
+            </a:ext>
+          </a:extLst>
+        </p:spPr>
+      </p:pic>
+      <p:pic>
+        <p:nvPicPr>
+          <p:cNvPr id="9" name="Picture 4" descr="Pink Taxi Vector Images (over 610)">
+            <a:extLst>
+              <a:ext uri="{FF2B5EF4-FFF2-40B4-BE49-F238E27FC236}">
+                <a16:creationId xmlns:a16="http://schemas.microsoft.com/office/drawing/2014/main" id="{BB80135C-0A63-A613-42C2-E8B3EC76A616}"/>
+              </a:ext>
+            </a:extLst>
+          </p:cNvPr>
+          <p:cNvPicPr>
+            <a:picLocks noChangeAspect="1" noChangeArrowheads="1"/>
+          </p:cNvPicPr>
+          <p:nvPr/>
+        </p:nvPicPr>
+        <p:blipFill rotWithShape="1">
+          <a:blip r:embed="rId3">
+            <a:extLst>
+              <a:ext uri="{28A0092B-C50C-407E-A947-70E740481C1C}">
+                <a14:useLocalDpi xmlns:a14="http://schemas.microsoft.com/office/drawing/2010/main" val="0"/>
+              </a:ext>
+            </a:extLst>
+          </a:blip>
+          <a:srcRect l="521" t="2572" r="-521" b="73862"/>
+          <a:stretch/>
+        </p:blipFill>
+        <p:spPr bwMode="auto">
+          <a:xfrm>
+            <a:off x="7197724" y="858982"/>
+            <a:ext cx="4070639" cy="1007654"/>
+          </a:xfrm>
+          <a:prstGeom prst="rect">
+            <a:avLst/>
+          </a:prstGeom>
+          <a:noFill/>
+          <a:extLst>
+            <a:ext uri="{909E8E84-426E-40DD-AFC4-6F175D3DCCD1}">
+              <a14:hiddenFill xmlns:a14="http://schemas.microsoft.com/office/drawing/2010/main">
+                <a:solidFill>
+                  <a:srgbClr val="FFFFFF"/>
+                </a:solidFill>
+              </a14:hiddenFill>
+            </a:ext>
+          </a:extLst>
+        </p:spPr>
+      </p:pic>
+      <p:sp>
+        <p:nvSpPr>
+          <p:cNvPr id="10" name="TextBox 9">
+            <a:extLst>
+              <a:ext uri="{FF2B5EF4-FFF2-40B4-BE49-F238E27FC236}">
+                <a16:creationId xmlns:a16="http://schemas.microsoft.com/office/drawing/2014/main" id="{05BB08B8-B76D-9427-A8DE-03A84859CBB5}"/>
+              </a:ext>
+            </a:extLst>
+          </p:cNvPr>
+          <p:cNvSpPr txBox="1"/>
+          <p:nvPr/>
+        </p:nvSpPr>
+        <p:spPr>
+          <a:xfrm>
+            <a:off x="6483927" y="1152627"/>
+            <a:ext cx="916997" cy="400110"/>
+          </a:xfrm>
+          <a:prstGeom prst="rect">
+            <a:avLst/>
+          </a:prstGeom>
+          <a:noFill/>
+        </p:spPr>
+        <p:txBody>
+          <a:bodyPr wrap="square" rtlCol="0">
+            <a:spAutoFit/>
+          </a:bodyPr>
+          <a:lstStyle/>
+          <a:p>
+            <a:r>
+              <a:rPr lang="en-CA" sz="2000" b="1" dirty="0"/>
+              <a:t>VS</a:t>
+            </a:r>
+          </a:p>
+        </p:txBody>
+      </p:sp>
+      <mc:AlternateContent xmlns:mc="http://schemas.openxmlformats.org/markup-compatibility/2006" xmlns:p14="http://schemas.microsoft.com/office/powerpoint/2010/main">
+        <mc:Choice Requires="p14">
+          <p:contentPart p14:bwMode="auto" r:id="rId4">
+            <p14:nvContentPartPr>
+              <p14:cNvPr id="18" name="Ink 17">
+                <a:extLst>
+                  <a:ext uri="{FF2B5EF4-FFF2-40B4-BE49-F238E27FC236}">
+                    <a16:creationId xmlns:a16="http://schemas.microsoft.com/office/drawing/2014/main" id="{25C79C3C-6019-9B9B-81CB-15E71E60C2DA}"/>
+                  </a:ext>
+                </a:extLst>
+              </p14:cNvPr>
+              <p14:cNvContentPartPr/>
+              <p14:nvPr/>
+            </p14:nvContentPartPr>
+            <p14:xfrm>
+              <a:off x="6732750" y="2037870"/>
+              <a:ext cx="360" cy="4429605"/>
+            </p14:xfrm>
+          </p:contentPart>
+        </mc:Choice>
+        <mc:Fallback xmlns="">
+          <p:pic>
+            <p:nvPicPr>
+              <p:cNvPr id="18" name="Ink 17">
+                <a:extLst>
+                  <a:ext uri="{FF2B5EF4-FFF2-40B4-BE49-F238E27FC236}">
+                    <a16:creationId xmlns:a16="http://schemas.microsoft.com/office/drawing/2014/main" id="{25C79C3C-6019-9B9B-81CB-15E71E60C2DA}"/>
+                  </a:ext>
+                </a:extLst>
+              </p:cNvPr>
+              <p:cNvPicPr/>
+              <p:nvPr/>
+            </p:nvPicPr>
+            <p:blipFill>
+              <a:blip r:embed="rId5"/>
+              <a:stretch>
+                <a:fillRect/>
+              </a:stretch>
+            </p:blipFill>
+            <p:spPr>
+              <a:xfrm>
+                <a:off x="6723750" y="2028870"/>
+                <a:ext cx="18000" cy="4447244"/>
+              </a:xfrm>
+              <a:prstGeom prst="rect">
+                <a:avLst/>
+              </a:prstGeom>
+            </p:spPr>
+          </p:pic>
+        </mc:Fallback>
+      </mc:AlternateContent>
+      <p:sp>
+        <p:nvSpPr>
+          <p:cNvPr id="19" name="TextBox 18">
+            <a:extLst>
+              <a:ext uri="{FF2B5EF4-FFF2-40B4-BE49-F238E27FC236}">
+                <a16:creationId xmlns:a16="http://schemas.microsoft.com/office/drawing/2014/main" id="{342C435B-EA03-CC11-EFB3-F18CB1414071}"/>
+              </a:ext>
+            </a:extLst>
+          </p:cNvPr>
+          <p:cNvSpPr txBox="1"/>
+          <p:nvPr/>
+        </p:nvSpPr>
+        <p:spPr>
+          <a:xfrm>
+            <a:off x="7472427" y="2295669"/>
+            <a:ext cx="3271773" cy="4158190"/>
+          </a:xfrm>
+          <a:prstGeom prst="rect">
+            <a:avLst/>
+          </a:prstGeom>
+          <a:noFill/>
+        </p:spPr>
+        <p:txBody>
+          <a:bodyPr wrap="square" rtlCol="0">
+            <a:spAutoFit/>
+          </a:bodyPr>
+          <a:lstStyle/>
+          <a:p>
+            <a:pPr marL="285750" indent="-285750" algn="l">
+              <a:lnSpc>
+                <a:spcPct val="150000"/>
+              </a:lnSpc>
+              <a:buFont typeface="Arial" panose="020B0604020202020204" pitchFamily="34" charset="0"/>
+              <a:buChar char="•"/>
+            </a:pPr>
+            <a:r>
+              <a:rPr lang="en-CA" sz="1600" dirty="0">
+                <a:solidFill>
+                  <a:srgbClr val="000000"/>
+                </a:solidFill>
+                <a:latin typeface="-apple-system"/>
+              </a:rPr>
+              <a:t>Around 60% uses card and 40% uses cash to pay</a:t>
+            </a:r>
+          </a:p>
+          <a:p>
+            <a:pPr marL="285750" indent="-285750" algn="l">
+              <a:lnSpc>
+                <a:spcPct val="150000"/>
+              </a:lnSpc>
+              <a:buFont typeface="Arial" panose="020B0604020202020204" pitchFamily="34" charset="0"/>
+              <a:buChar char="•"/>
+            </a:pPr>
+            <a:r>
+              <a:rPr lang="en-CA" sz="1600" i="0" dirty="0">
+                <a:solidFill>
+                  <a:srgbClr val="000000"/>
+                </a:solidFill>
+                <a:effectLst/>
+                <a:latin typeface="-apple-system"/>
+              </a:rPr>
+              <a:t>More profit per distance then Pink Cab</a:t>
+            </a:r>
+          </a:p>
+          <a:p>
+            <a:pPr marL="285750" indent="-285750" algn="l">
+              <a:lnSpc>
+                <a:spcPct val="150000"/>
+              </a:lnSpc>
+              <a:buFont typeface="Arial" panose="020B0604020202020204" pitchFamily="34" charset="0"/>
+              <a:buChar char="•"/>
+            </a:pPr>
+            <a:r>
+              <a:rPr lang="en-CA" sz="1600" i="0" dirty="0">
+                <a:solidFill>
+                  <a:srgbClr val="000000"/>
+                </a:solidFill>
+                <a:effectLst/>
+                <a:latin typeface="-apple-system"/>
+              </a:rPr>
+              <a:t>More profit per price charged then Pink Cab (almost double)</a:t>
+            </a:r>
+          </a:p>
+          <a:p>
+            <a:pPr marL="285750" indent="-285750" algn="l">
+              <a:lnSpc>
+                <a:spcPct val="150000"/>
+              </a:lnSpc>
+              <a:buFont typeface="Arial" panose="020B0604020202020204" pitchFamily="34" charset="0"/>
+              <a:buChar char="•"/>
+            </a:pPr>
+            <a:r>
+              <a:rPr lang="en-CA" sz="1600" dirty="0">
+                <a:solidFill>
+                  <a:srgbClr val="000000"/>
+                </a:solidFill>
+                <a:latin typeface="-apple-system"/>
+              </a:rPr>
+              <a:t>Charge more per distance then Pink Cab</a:t>
+            </a:r>
+          </a:p>
+          <a:p>
+            <a:pPr marL="285750" indent="-285750" algn="l">
+              <a:lnSpc>
+                <a:spcPct val="150000"/>
+              </a:lnSpc>
+              <a:buFont typeface="Arial" panose="020B0604020202020204" pitchFamily="34" charset="0"/>
+              <a:buChar char="•"/>
+            </a:pPr>
+            <a:r>
+              <a:rPr lang="en-CA" sz="1600" i="0" dirty="0">
+                <a:solidFill>
+                  <a:srgbClr val="000000"/>
+                </a:solidFill>
+                <a:effectLst/>
+                <a:latin typeface="-apple-system"/>
+              </a:rPr>
+              <a:t>8 times the tot</a:t>
+            </a:r>
+            <a:r>
+              <a:rPr lang="en-CA" sz="1600" dirty="0">
+                <a:solidFill>
+                  <a:srgbClr val="000000"/>
+                </a:solidFill>
+                <a:latin typeface="-apple-system"/>
+              </a:rPr>
+              <a:t>al profit of Pink Cab</a:t>
+            </a:r>
+            <a:br>
+              <a:rPr lang="en-CA" i="0" dirty="0">
+                <a:solidFill>
+                  <a:srgbClr val="000000"/>
+                </a:solidFill>
+                <a:effectLst/>
+                <a:latin typeface="-apple-system"/>
+              </a:rPr>
+            </a:br>
+            <a:endParaRPr lang="en-CA" i="0" dirty="0">
+              <a:effectLst/>
+              <a:latin typeface="-apple-system"/>
+            </a:endParaRPr>
+          </a:p>
+        </p:txBody>
+      </p:sp>
+    </p:spTree>
+    <p:extLst>
+      <p:ext uri="{BB962C8B-B14F-4D97-AF65-F5344CB8AC3E}">
+        <p14:creationId xmlns:p14="http://schemas.microsoft.com/office/powerpoint/2010/main" val="228729593"/>
+      </p:ext>
+    </p:extLst>
+  </p:cSld>
+  <p:clrMapOvr>
+    <a:masterClrMapping/>
+  </p:clrMapOvr>
+</p:sld>
+</file>
+
+<file path=ppt/slides/slide24.xml><?xml version="1.0" encoding="utf-8"?>
+<p:sld xmlns:a="http://schemas.openxmlformats.org/drawingml/2006/main" xmlns:r="http://schemas.openxmlformats.org/officeDocument/2006/relationships" xmlns:p="http://schemas.openxmlformats.org/presentationml/2006/main">
+  <p:cSld>
+    <p:spTree>
+      <p:nvGrpSpPr>
+        <p:cNvPr id="1" name=""/>
+        <p:cNvGrpSpPr/>
+        <p:nvPr/>
+      </p:nvGrpSpPr>
+      <p:grpSpPr>
+        <a:xfrm>
+          <a:off x="0" y="0"/>
+          <a:ext cx="0" cy="0"/>
+          <a:chOff x="0" y="0"/>
+          <a:chExt cx="0" cy="0"/>
+        </a:xfrm>
+      </p:grpSpPr>
+      <p:sp>
+        <p:nvSpPr>
+          <p:cNvPr id="2" name="Title 1">
+            <a:extLst>
+              <a:ext uri="{FF2B5EF4-FFF2-40B4-BE49-F238E27FC236}">
+                <a16:creationId xmlns:a16="http://schemas.microsoft.com/office/drawing/2014/main" id="{E8B8F26E-9345-4747-9094-972E38700A17}"/>
+              </a:ext>
+            </a:extLst>
+          </p:cNvPr>
+          <p:cNvSpPr>
+            <a:spLocks noGrp="1"/>
+          </p:cNvSpPr>
+          <p:nvPr>
+            <p:ph type="ctrTitle"/>
+          </p:nvPr>
+        </p:nvSpPr>
+        <p:spPr>
+          <a:xfrm rot="5400000">
+            <a:off x="-2601688" y="2601687"/>
+            <a:ext cx="6858002" cy="1654627"/>
+          </a:xfrm>
+          <a:solidFill>
+            <a:srgbClr val="3B3B3B"/>
+          </a:solidFill>
+        </p:spPr>
+        <p:txBody>
+          <a:bodyPr vert="vert270" anchor="t" anchorCtr="0"/>
+          <a:lstStyle/>
+          <a:p>
+            <a:endParaRPr lang="en-US" b="1" dirty="0">
+              <a:solidFill>
+                <a:srgbClr val="FF6600"/>
+              </a:solidFill>
+            </a:endParaRPr>
+          </a:p>
+        </p:txBody>
+      </p:sp>
+      <p:pic>
+        <p:nvPicPr>
+          <p:cNvPr id="4" name="Picture 3">
+            <a:extLst>
+              <a:ext uri="{FF2B5EF4-FFF2-40B4-BE49-F238E27FC236}">
+                <a16:creationId xmlns:a16="http://schemas.microsoft.com/office/drawing/2014/main" id="{7A465064-0714-5743-882B-8875105A7023}"/>
+              </a:ext>
+            </a:extLst>
+          </p:cNvPr>
+          <p:cNvPicPr>
+            <a:picLocks noChangeAspect="1"/>
+          </p:cNvPicPr>
+          <p:nvPr/>
+        </p:nvPicPr>
+        <p:blipFill>
+          <a:blip r:embed="rId2" cstate="print">
+            <a:extLst>
+              <a:ext uri="{28A0092B-C50C-407E-A947-70E740481C1C}">
+                <a14:useLocalDpi xmlns:a14="http://schemas.microsoft.com/office/drawing/2010/main" val="0"/>
+              </a:ext>
+            </a:extLst>
+          </a:blip>
+          <a:stretch>
+            <a:fillRect/>
+          </a:stretch>
+        </p:blipFill>
+        <p:spPr>
+          <a:xfrm>
+            <a:off x="0" y="5863771"/>
+            <a:ext cx="1654627" cy="994232"/>
+          </a:xfrm>
+          <a:prstGeom prst="rect">
+            <a:avLst/>
+          </a:prstGeom>
+        </p:spPr>
+      </p:pic>
+      <p:sp>
+        <p:nvSpPr>
+          <p:cNvPr id="6" name="Subtitle 5">
+            <a:extLst>
+              <a:ext uri="{FF2B5EF4-FFF2-40B4-BE49-F238E27FC236}">
+                <a16:creationId xmlns:a16="http://schemas.microsoft.com/office/drawing/2014/main" id="{2D4BA697-580E-5544-8F2F-194AD99B859F}"/>
+              </a:ext>
+            </a:extLst>
+          </p:cNvPr>
+          <p:cNvSpPr>
+            <a:spLocks noGrp="1"/>
+          </p:cNvSpPr>
+          <p:nvPr>
+            <p:ph type="subTitle" idx="1"/>
+          </p:nvPr>
+        </p:nvSpPr>
+        <p:spPr>
+          <a:xfrm>
+            <a:off x="1654627" y="0"/>
+            <a:ext cx="9170391" cy="1655762"/>
+          </a:xfrm>
+        </p:spPr>
+        <p:txBody>
+          <a:bodyPr>
+            <a:normAutofit/>
+          </a:bodyPr>
+          <a:lstStyle/>
+          <a:p>
+            <a:pPr algn="l"/>
+            <a:r>
+              <a:rPr lang="en-US" sz="5500" dirty="0">
+                <a:solidFill>
+                  <a:srgbClr val="FF6600"/>
+                </a:solidFill>
+              </a:rPr>
+              <a:t>Conclusion</a:t>
+            </a:r>
+          </a:p>
+          <a:p>
+            <a:pPr algn="l"/>
+            <a:endParaRPr lang="en-US" sz="6600" dirty="0">
+              <a:solidFill>
+                <a:srgbClr val="FF6600"/>
+              </a:solidFill>
+            </a:endParaRPr>
+          </a:p>
+        </p:txBody>
+      </p:sp>
+      <p:pic>
+        <p:nvPicPr>
+          <p:cNvPr id="9" name="Picture 4" descr="Pink Taxi Vector Images (over 610)">
+            <a:extLst>
+              <a:ext uri="{FF2B5EF4-FFF2-40B4-BE49-F238E27FC236}">
+                <a16:creationId xmlns:a16="http://schemas.microsoft.com/office/drawing/2014/main" id="{BB80135C-0A63-A613-42C2-E8B3EC76A616}"/>
+              </a:ext>
+            </a:extLst>
+          </p:cNvPr>
+          <p:cNvPicPr>
+            <a:picLocks noChangeAspect="1" noChangeArrowheads="1"/>
+          </p:cNvPicPr>
+          <p:nvPr/>
+        </p:nvPicPr>
+        <p:blipFill rotWithShape="1">
+          <a:blip r:embed="rId3">
+            <a:extLst>
+              <a:ext uri="{28A0092B-C50C-407E-A947-70E740481C1C}">
+                <a14:useLocalDpi xmlns:a14="http://schemas.microsoft.com/office/drawing/2010/main" val="0"/>
+              </a:ext>
+            </a:extLst>
+          </a:blip>
+          <a:srcRect l="521" t="2572" r="-521" b="73862"/>
+          <a:stretch/>
+        </p:blipFill>
+        <p:spPr bwMode="auto">
+          <a:xfrm>
+            <a:off x="4697428" y="1655762"/>
+            <a:ext cx="4070639" cy="1007654"/>
+          </a:xfrm>
+          <a:prstGeom prst="rect">
+            <a:avLst/>
+          </a:prstGeom>
+          <a:noFill/>
+          <a:extLst>
+            <a:ext uri="{909E8E84-426E-40DD-AFC4-6F175D3DCCD1}">
+              <a14:hiddenFill xmlns:a14="http://schemas.microsoft.com/office/drawing/2010/main">
+                <a:solidFill>
+                  <a:srgbClr val="FFFFFF"/>
+                </a:solidFill>
+              </a14:hiddenFill>
+            </a:ext>
+          </a:extLst>
+        </p:spPr>
+      </p:pic>
+      <p:sp>
+        <p:nvSpPr>
+          <p:cNvPr id="19" name="TextBox 18">
+            <a:extLst>
+              <a:ext uri="{FF2B5EF4-FFF2-40B4-BE49-F238E27FC236}">
+                <a16:creationId xmlns:a16="http://schemas.microsoft.com/office/drawing/2014/main" id="{342C435B-EA03-CC11-EFB3-F18CB1414071}"/>
+              </a:ext>
+            </a:extLst>
+          </p:cNvPr>
+          <p:cNvSpPr txBox="1"/>
+          <p:nvPr/>
+        </p:nvSpPr>
+        <p:spPr>
+          <a:xfrm>
+            <a:off x="2614851" y="3209921"/>
+            <a:ext cx="8235791" cy="2542363"/>
+          </a:xfrm>
+          <a:prstGeom prst="rect">
+            <a:avLst/>
+          </a:prstGeom>
+          <a:noFill/>
+        </p:spPr>
+        <p:txBody>
+          <a:bodyPr wrap="square" rtlCol="0">
+            <a:spAutoFit/>
+          </a:bodyPr>
+          <a:lstStyle/>
+          <a:p>
+            <a:pPr algn="l">
+              <a:lnSpc>
+                <a:spcPct val="150000"/>
+              </a:lnSpc>
+            </a:pPr>
+            <a:r>
+              <a:rPr lang="en-CA" i="0" dirty="0">
+                <a:solidFill>
+                  <a:srgbClr val="000000"/>
+                </a:solidFill>
+                <a:effectLst/>
+                <a:latin typeface="-apple-system"/>
+              </a:rPr>
+              <a:t>In conclusion, based on the EDA and </a:t>
+            </a:r>
+            <a:r>
+              <a:rPr lang="en-CA" dirty="0">
+                <a:solidFill>
+                  <a:srgbClr val="000000"/>
+                </a:solidFill>
+                <a:latin typeface="-apple-system"/>
+              </a:rPr>
+              <a:t>h</a:t>
+            </a:r>
+            <a:r>
+              <a:rPr lang="en-CA" i="0" dirty="0">
+                <a:solidFill>
+                  <a:srgbClr val="000000"/>
+                </a:solidFill>
+                <a:effectLst/>
+                <a:latin typeface="-apple-system"/>
+              </a:rPr>
+              <a:t>ypothesis testing, Yellow Cab company has 7 – 8 times the profit of Pink Cab company per year.  The Yellow Cab company also has 3 – 5 times the about of transactions of Pink Cab. </a:t>
+            </a:r>
+            <a:r>
+              <a:rPr lang="en-CA" dirty="0">
+                <a:solidFill>
+                  <a:srgbClr val="000000"/>
+                </a:solidFill>
+                <a:latin typeface="-apple-system"/>
+              </a:rPr>
+              <a:t>Yellow Cab makes more profit per distance, more profit per price charged, and more profit per distance. Therefore, XYZ should invest into Yellow Cab then Pink Cab.</a:t>
+            </a:r>
+            <a:br>
+              <a:rPr lang="en-CA" i="0" dirty="0">
+                <a:solidFill>
+                  <a:srgbClr val="000000"/>
+                </a:solidFill>
+                <a:effectLst/>
+                <a:latin typeface="-apple-system"/>
+              </a:rPr>
+            </a:br>
+            <a:endParaRPr lang="en-CA" i="0" dirty="0">
+              <a:effectLst/>
+              <a:latin typeface="-apple-system"/>
+            </a:endParaRPr>
+          </a:p>
+        </p:txBody>
+      </p:sp>
+    </p:spTree>
+    <p:extLst>
+      <p:ext uri="{BB962C8B-B14F-4D97-AF65-F5344CB8AC3E}">
+        <p14:creationId xmlns:p14="http://schemas.microsoft.com/office/powerpoint/2010/main" val="3221203717"/>
+      </p:ext>
+    </p:extLst>
+  </p:cSld>
+  <p:clrMapOvr>
+    <a:masterClrMapping/>
+  </p:clrMapOvr>
+</p:sld>
+</file>
+
+<file path=ppt/slides/slide25.xml><?xml version="1.0" encoding="utf-8"?>
 <p:sld xmlns:a="http://schemas.openxmlformats.org/drawingml/2006/main" xmlns:r="http://schemas.openxmlformats.org/officeDocument/2006/relationships" xmlns:p="http://schemas.openxmlformats.org/presentationml/2006/main">
   <p:cSld>
     <p:spTree>

</xml_diff>